<commit_message>
Updated slides and meeting notes
</commit_message>
<xml_diff>
--- a/developer_meeting_notes/2016_1_12/meeting_agenda.pptx
+++ b/developer_meeting_notes/2016_1_12/meeting_agenda.pptx
@@ -4,6 +4,9 @@
   <p:sldMasterIdLst>
     <p:sldMasterId id="2147483648" r:id="rId1"/>
   </p:sldMasterIdLst>
+  <p:notesMasterIdLst>
+    <p:notesMasterId r:id="rId18"/>
+  </p:notesMasterIdLst>
   <p:sldIdLst>
     <p:sldId id="256" r:id="rId2"/>
     <p:sldId id="257" r:id="rId3"/>
@@ -11,8 +14,16 @@
     <p:sldId id="259" r:id="rId5"/>
     <p:sldId id="268" r:id="rId6"/>
     <p:sldId id="261" r:id="rId7"/>
-    <p:sldId id="266" r:id="rId8"/>
-    <p:sldId id="262" r:id="rId9"/>
+    <p:sldId id="273" r:id="rId8"/>
+    <p:sldId id="276" r:id="rId9"/>
+    <p:sldId id="277" r:id="rId10"/>
+    <p:sldId id="278" r:id="rId11"/>
+    <p:sldId id="274" r:id="rId12"/>
+    <p:sldId id="270" r:id="rId13"/>
+    <p:sldId id="271" r:id="rId14"/>
+    <p:sldId id="272" r:id="rId15"/>
+    <p:sldId id="266" r:id="rId16"/>
+    <p:sldId id="262" r:id="rId17"/>
   </p:sldIdLst>
   <p:sldSz cx="9144000" cy="6858000" type="screen4x3"/>
   <p:notesSz cx="6858000" cy="9144000"/>
@@ -144,6 +155,568 @@
 </p:presentation>
 </file>
 
+<file path=ppt/notesMasters/notesMaster1.xml><?xml version="1.0" encoding="utf-8"?>
+<p:notesMaster xmlns:a="http://schemas.openxmlformats.org/drawingml/2006/main" xmlns:r="http://schemas.openxmlformats.org/officeDocument/2006/relationships" xmlns:p="http://schemas.openxmlformats.org/presentationml/2006/main">
+  <p:cSld>
+    <p:bg>
+      <p:bgRef idx="1001">
+        <a:schemeClr val="bg1"/>
+      </p:bgRef>
+    </p:bg>
+    <p:spTree>
+      <p:nvGrpSpPr>
+        <p:cNvPr id="1" name=""/>
+        <p:cNvGrpSpPr/>
+        <p:nvPr/>
+      </p:nvGrpSpPr>
+      <p:grpSpPr>
+        <a:xfrm>
+          <a:off x="0" y="0"/>
+          <a:ext cx="0" cy="0"/>
+          <a:chOff x="0" y="0"/>
+          <a:chExt cx="0" cy="0"/>
+        </a:xfrm>
+      </p:grpSpPr>
+      <p:sp>
+        <p:nvSpPr>
+          <p:cNvPr id="2" name="Header Placeholder 1"/>
+          <p:cNvSpPr>
+            <a:spLocks noGrp="1"/>
+          </p:cNvSpPr>
+          <p:nvPr>
+            <p:ph type="hdr" sz="quarter"/>
+          </p:nvPr>
+        </p:nvSpPr>
+        <p:spPr>
+          <a:xfrm>
+            <a:off x="0" y="0"/>
+            <a:ext cx="2971800" cy="457200"/>
+          </a:xfrm>
+          <a:prstGeom prst="rect">
+            <a:avLst/>
+          </a:prstGeom>
+        </p:spPr>
+        <p:txBody>
+          <a:bodyPr vert="horz" lIns="91440" tIns="45720" rIns="91440" bIns="45720" rtlCol="0"/>
+          <a:lstStyle>
+            <a:lvl1pPr algn="l">
+              <a:defRPr sz="1200"/>
+            </a:lvl1pPr>
+          </a:lstStyle>
+          <a:p>
+            <a:endParaRPr lang="en-US"/>
+          </a:p>
+        </p:txBody>
+      </p:sp>
+      <p:sp>
+        <p:nvSpPr>
+          <p:cNvPr id="3" name="Date Placeholder 2"/>
+          <p:cNvSpPr>
+            <a:spLocks noGrp="1"/>
+          </p:cNvSpPr>
+          <p:nvPr>
+            <p:ph type="dt" idx="1"/>
+          </p:nvPr>
+        </p:nvSpPr>
+        <p:spPr>
+          <a:xfrm>
+            <a:off x="3884613" y="0"/>
+            <a:ext cx="2971800" cy="457200"/>
+          </a:xfrm>
+          <a:prstGeom prst="rect">
+            <a:avLst/>
+          </a:prstGeom>
+        </p:spPr>
+        <p:txBody>
+          <a:bodyPr vert="horz" lIns="91440" tIns="45720" rIns="91440" bIns="45720" rtlCol="0"/>
+          <a:lstStyle>
+            <a:lvl1pPr algn="r">
+              <a:defRPr sz="1200"/>
+            </a:lvl1pPr>
+          </a:lstStyle>
+          <a:p>
+            <a:fld id="{62A5992D-7355-40E7-98B5-B2B22F517604}" type="datetimeFigureOut">
+              <a:rPr lang="en-US" smtClean="0"/>
+              <a:pPr/>
+              <a:t>1/12/2016</a:t>
+            </a:fld>
+            <a:endParaRPr lang="en-US"/>
+          </a:p>
+        </p:txBody>
+      </p:sp>
+      <p:sp>
+        <p:nvSpPr>
+          <p:cNvPr id="4" name="Slide Image Placeholder 3"/>
+          <p:cNvSpPr>
+            <a:spLocks noGrp="1" noRot="1" noChangeAspect="1"/>
+          </p:cNvSpPr>
+          <p:nvPr>
+            <p:ph type="sldImg" idx="2"/>
+          </p:nvPr>
+        </p:nvSpPr>
+        <p:spPr>
+          <a:xfrm>
+            <a:off x="1143000" y="685800"/>
+            <a:ext cx="4572000" cy="3429000"/>
+          </a:xfrm>
+          <a:prstGeom prst="rect">
+            <a:avLst/>
+          </a:prstGeom>
+          <a:noFill/>
+          <a:ln w="12700">
+            <a:solidFill>
+              <a:prstClr val="black"/>
+            </a:solidFill>
+          </a:ln>
+        </p:spPr>
+        <p:txBody>
+          <a:bodyPr vert="horz" lIns="91440" tIns="45720" rIns="91440" bIns="45720" rtlCol="0" anchor="ctr"/>
+          <a:lstStyle/>
+          <a:p>
+            <a:endParaRPr lang="en-US"/>
+          </a:p>
+        </p:txBody>
+      </p:sp>
+      <p:sp>
+        <p:nvSpPr>
+          <p:cNvPr id="5" name="Notes Placeholder 4"/>
+          <p:cNvSpPr>
+            <a:spLocks noGrp="1"/>
+          </p:cNvSpPr>
+          <p:nvPr>
+            <p:ph type="body" sz="quarter" idx="3"/>
+          </p:nvPr>
+        </p:nvSpPr>
+        <p:spPr>
+          <a:xfrm>
+            <a:off x="685800" y="4343400"/>
+            <a:ext cx="5486400" cy="4114800"/>
+          </a:xfrm>
+          <a:prstGeom prst="rect">
+            <a:avLst/>
+          </a:prstGeom>
+        </p:spPr>
+        <p:txBody>
+          <a:bodyPr vert="horz" lIns="91440" tIns="45720" rIns="91440" bIns="45720" rtlCol="0">
+            <a:normAutofit/>
+          </a:bodyPr>
+          <a:lstStyle/>
+          <a:p>
+            <a:pPr lvl="0"/>
+            <a:r>
+              <a:rPr lang="en-US" smtClean="0"/>
+              <a:t>Click to edit Master text styles</a:t>
+            </a:r>
+          </a:p>
+          <a:p>
+            <a:pPr lvl="1"/>
+            <a:r>
+              <a:rPr lang="en-US" smtClean="0"/>
+              <a:t>Second level</a:t>
+            </a:r>
+          </a:p>
+          <a:p>
+            <a:pPr lvl="2"/>
+            <a:r>
+              <a:rPr lang="en-US" smtClean="0"/>
+              <a:t>Third level</a:t>
+            </a:r>
+          </a:p>
+          <a:p>
+            <a:pPr lvl="3"/>
+            <a:r>
+              <a:rPr lang="en-US" smtClean="0"/>
+              <a:t>Fourth level</a:t>
+            </a:r>
+          </a:p>
+          <a:p>
+            <a:pPr lvl="4"/>
+            <a:r>
+              <a:rPr lang="en-US" smtClean="0"/>
+              <a:t>Fifth level</a:t>
+            </a:r>
+            <a:endParaRPr lang="en-US"/>
+          </a:p>
+        </p:txBody>
+      </p:sp>
+      <p:sp>
+        <p:nvSpPr>
+          <p:cNvPr id="6" name="Footer Placeholder 5"/>
+          <p:cNvSpPr>
+            <a:spLocks noGrp="1"/>
+          </p:cNvSpPr>
+          <p:nvPr>
+            <p:ph type="ftr" sz="quarter" idx="4"/>
+          </p:nvPr>
+        </p:nvSpPr>
+        <p:spPr>
+          <a:xfrm>
+            <a:off x="0" y="8685213"/>
+            <a:ext cx="2971800" cy="457200"/>
+          </a:xfrm>
+          <a:prstGeom prst="rect">
+            <a:avLst/>
+          </a:prstGeom>
+        </p:spPr>
+        <p:txBody>
+          <a:bodyPr vert="horz" lIns="91440" tIns="45720" rIns="91440" bIns="45720" rtlCol="0" anchor="b"/>
+          <a:lstStyle>
+            <a:lvl1pPr algn="l">
+              <a:defRPr sz="1200"/>
+            </a:lvl1pPr>
+          </a:lstStyle>
+          <a:p>
+            <a:endParaRPr lang="en-US"/>
+          </a:p>
+        </p:txBody>
+      </p:sp>
+      <p:sp>
+        <p:nvSpPr>
+          <p:cNvPr id="7" name="Slide Number Placeholder 6"/>
+          <p:cNvSpPr>
+            <a:spLocks noGrp="1"/>
+          </p:cNvSpPr>
+          <p:nvPr>
+            <p:ph type="sldNum" sz="quarter" idx="5"/>
+          </p:nvPr>
+        </p:nvSpPr>
+        <p:spPr>
+          <a:xfrm>
+            <a:off x="3884613" y="8685213"/>
+            <a:ext cx="2971800" cy="457200"/>
+          </a:xfrm>
+          <a:prstGeom prst="rect">
+            <a:avLst/>
+          </a:prstGeom>
+        </p:spPr>
+        <p:txBody>
+          <a:bodyPr vert="horz" lIns="91440" tIns="45720" rIns="91440" bIns="45720" rtlCol="0" anchor="b"/>
+          <a:lstStyle>
+            <a:lvl1pPr algn="r">
+              <a:defRPr sz="1200"/>
+            </a:lvl1pPr>
+          </a:lstStyle>
+          <a:p>
+            <a:fld id="{9C58A961-DA8C-40A0-B54E-6933E68A40F6}" type="slidenum">
+              <a:rPr lang="en-US" smtClean="0"/>
+              <a:pPr/>
+              <a:t>‹#›</a:t>
+            </a:fld>
+            <a:endParaRPr lang="en-US"/>
+          </a:p>
+        </p:txBody>
+      </p:sp>
+    </p:spTree>
+  </p:cSld>
+  <p:clrMap bg1="lt1" tx1="dk1" bg2="lt2" tx2="dk2" accent1="accent1" accent2="accent2" accent3="accent3" accent4="accent4" accent5="accent5" accent6="accent6" hlink="hlink" folHlink="folHlink"/>
+  <p:notesStyle>
+    <a:lvl1pPr marL="0" algn="l" defTabSz="914400" rtl="0" eaLnBrk="1" latinLnBrk="0" hangingPunct="1">
+      <a:defRPr sz="1200" kern="1200">
+        <a:solidFill>
+          <a:schemeClr val="tx1"/>
+        </a:solidFill>
+        <a:latin typeface="+mn-lt"/>
+        <a:ea typeface="+mn-ea"/>
+        <a:cs typeface="+mn-cs"/>
+      </a:defRPr>
+    </a:lvl1pPr>
+    <a:lvl2pPr marL="457200" algn="l" defTabSz="914400" rtl="0" eaLnBrk="1" latinLnBrk="0" hangingPunct="1">
+      <a:defRPr sz="1200" kern="1200">
+        <a:solidFill>
+          <a:schemeClr val="tx1"/>
+        </a:solidFill>
+        <a:latin typeface="+mn-lt"/>
+        <a:ea typeface="+mn-ea"/>
+        <a:cs typeface="+mn-cs"/>
+      </a:defRPr>
+    </a:lvl2pPr>
+    <a:lvl3pPr marL="914400" algn="l" defTabSz="914400" rtl="0" eaLnBrk="1" latinLnBrk="0" hangingPunct="1">
+      <a:defRPr sz="1200" kern="1200">
+        <a:solidFill>
+          <a:schemeClr val="tx1"/>
+        </a:solidFill>
+        <a:latin typeface="+mn-lt"/>
+        <a:ea typeface="+mn-ea"/>
+        <a:cs typeface="+mn-cs"/>
+      </a:defRPr>
+    </a:lvl3pPr>
+    <a:lvl4pPr marL="1371600" algn="l" defTabSz="914400" rtl="0" eaLnBrk="1" latinLnBrk="0" hangingPunct="1">
+      <a:defRPr sz="1200" kern="1200">
+        <a:solidFill>
+          <a:schemeClr val="tx1"/>
+        </a:solidFill>
+        <a:latin typeface="+mn-lt"/>
+        <a:ea typeface="+mn-ea"/>
+        <a:cs typeface="+mn-cs"/>
+      </a:defRPr>
+    </a:lvl4pPr>
+    <a:lvl5pPr marL="1828800" algn="l" defTabSz="914400" rtl="0" eaLnBrk="1" latinLnBrk="0" hangingPunct="1">
+      <a:defRPr sz="1200" kern="1200">
+        <a:solidFill>
+          <a:schemeClr val="tx1"/>
+        </a:solidFill>
+        <a:latin typeface="+mn-lt"/>
+        <a:ea typeface="+mn-ea"/>
+        <a:cs typeface="+mn-cs"/>
+      </a:defRPr>
+    </a:lvl5pPr>
+    <a:lvl6pPr marL="2286000" algn="l" defTabSz="914400" rtl="0" eaLnBrk="1" latinLnBrk="0" hangingPunct="1">
+      <a:defRPr sz="1200" kern="1200">
+        <a:solidFill>
+          <a:schemeClr val="tx1"/>
+        </a:solidFill>
+        <a:latin typeface="+mn-lt"/>
+        <a:ea typeface="+mn-ea"/>
+        <a:cs typeface="+mn-cs"/>
+      </a:defRPr>
+    </a:lvl6pPr>
+    <a:lvl7pPr marL="2743200" algn="l" defTabSz="914400" rtl="0" eaLnBrk="1" latinLnBrk="0" hangingPunct="1">
+      <a:defRPr sz="1200" kern="1200">
+        <a:solidFill>
+          <a:schemeClr val="tx1"/>
+        </a:solidFill>
+        <a:latin typeface="+mn-lt"/>
+        <a:ea typeface="+mn-ea"/>
+        <a:cs typeface="+mn-cs"/>
+      </a:defRPr>
+    </a:lvl7pPr>
+    <a:lvl8pPr marL="3200400" algn="l" defTabSz="914400" rtl="0" eaLnBrk="1" latinLnBrk="0" hangingPunct="1">
+      <a:defRPr sz="1200" kern="1200">
+        <a:solidFill>
+          <a:schemeClr val="tx1"/>
+        </a:solidFill>
+        <a:latin typeface="+mn-lt"/>
+        <a:ea typeface="+mn-ea"/>
+        <a:cs typeface="+mn-cs"/>
+      </a:defRPr>
+    </a:lvl8pPr>
+    <a:lvl9pPr marL="3657600" algn="l" defTabSz="914400" rtl="0" eaLnBrk="1" latinLnBrk="0" hangingPunct="1">
+      <a:defRPr sz="1200" kern="1200">
+        <a:solidFill>
+          <a:schemeClr val="tx1"/>
+        </a:solidFill>
+        <a:latin typeface="+mn-lt"/>
+        <a:ea typeface="+mn-ea"/>
+        <a:cs typeface="+mn-cs"/>
+      </a:defRPr>
+    </a:lvl9pPr>
+  </p:notesStyle>
+</p:notesMaster>
+</file>
+
+<file path=ppt/notesSlides/notesSlide1.xml><?xml version="1.0" encoding="utf-8"?>
+<p:notes xmlns:a="http://schemas.openxmlformats.org/drawingml/2006/main" xmlns:r="http://schemas.openxmlformats.org/officeDocument/2006/relationships" xmlns:p="http://schemas.openxmlformats.org/presentationml/2006/main">
+  <p:cSld>
+    <p:spTree>
+      <p:nvGrpSpPr>
+        <p:cNvPr id="1" name=""/>
+        <p:cNvGrpSpPr/>
+        <p:nvPr/>
+      </p:nvGrpSpPr>
+      <p:grpSpPr>
+        <a:xfrm>
+          <a:off x="0" y="0"/>
+          <a:ext cx="0" cy="0"/>
+          <a:chOff x="0" y="0"/>
+          <a:chExt cx="0" cy="0"/>
+        </a:xfrm>
+      </p:grpSpPr>
+      <p:sp>
+        <p:nvSpPr>
+          <p:cNvPr id="2" name="Slide Image Placeholder 1"/>
+          <p:cNvSpPr>
+            <a:spLocks noGrp="1" noRot="1" noChangeAspect="1" noResize="1"/>
+          </p:cNvSpPr>
+          <p:nvPr>
+            <p:ph type="sldImg"/>
+          </p:nvPr>
+        </p:nvSpPr>
+        <p:spPr>
+          <a:solidFill>
+            <a:srgbClr val="729FCF"/>
+          </a:solidFill>
+          <a:ln w="25400">
+            <a:solidFill>
+              <a:srgbClr val="3465A4"/>
+            </a:solidFill>
+            <a:prstDash val="solid"/>
+          </a:ln>
+        </p:spPr>
+      </p:sp>
+      <p:sp>
+        <p:nvSpPr>
+          <p:cNvPr id="3" name="Notes Placeholder 2"/>
+          <p:cNvSpPr txBox="1">
+            <a:spLocks noGrp="1"/>
+          </p:cNvSpPr>
+          <p:nvPr>
+            <p:ph type="body" sz="quarter" idx="1"/>
+          </p:nvPr>
+        </p:nvSpPr>
+        <p:spPr>
+          <a:xfrm>
+            <a:off x="685799" y="4343236"/>
+            <a:ext cx="5486082" cy="4114800"/>
+          </a:xfrm>
+        </p:spPr>
+        <p:txBody>
+          <a:bodyPr/>
+          <a:lstStyle/>
+          <a:p>
+            <a:endParaRPr lang="en-US"/>
+          </a:p>
+        </p:txBody>
+      </p:sp>
+    </p:spTree>
+  </p:cSld>
+  <p:clrMapOvr>
+    <a:masterClrMapping/>
+  </p:clrMapOvr>
+</p:notes>
+</file>
+
+<file path=ppt/notesSlides/notesSlide2.xml><?xml version="1.0" encoding="utf-8"?>
+<p:notes xmlns:a="http://schemas.openxmlformats.org/drawingml/2006/main" xmlns:r="http://schemas.openxmlformats.org/officeDocument/2006/relationships" xmlns:p="http://schemas.openxmlformats.org/presentationml/2006/main">
+  <p:cSld>
+    <p:spTree>
+      <p:nvGrpSpPr>
+        <p:cNvPr id="1" name=""/>
+        <p:cNvGrpSpPr/>
+        <p:nvPr/>
+      </p:nvGrpSpPr>
+      <p:grpSpPr>
+        <a:xfrm>
+          <a:off x="0" y="0"/>
+          <a:ext cx="0" cy="0"/>
+          <a:chOff x="0" y="0"/>
+          <a:chExt cx="0" cy="0"/>
+        </a:xfrm>
+      </p:grpSpPr>
+      <p:sp>
+        <p:nvSpPr>
+          <p:cNvPr id="2" name="Slide Image Placeholder 1"/>
+          <p:cNvSpPr>
+            <a:spLocks noGrp="1" noRot="1" noChangeAspect="1" noResize="1"/>
+          </p:cNvSpPr>
+          <p:nvPr>
+            <p:ph type="sldImg"/>
+          </p:nvPr>
+        </p:nvSpPr>
+        <p:spPr>
+          <a:solidFill>
+            <a:srgbClr val="729FCF"/>
+          </a:solidFill>
+          <a:ln w="25400">
+            <a:solidFill>
+              <a:srgbClr val="3465A4"/>
+            </a:solidFill>
+            <a:prstDash val="solid"/>
+          </a:ln>
+        </p:spPr>
+      </p:sp>
+      <p:sp>
+        <p:nvSpPr>
+          <p:cNvPr id="3" name="Notes Placeholder 2"/>
+          <p:cNvSpPr txBox="1">
+            <a:spLocks noGrp="1"/>
+          </p:cNvSpPr>
+          <p:nvPr>
+            <p:ph type="body" sz="quarter" idx="1"/>
+          </p:nvPr>
+        </p:nvSpPr>
+        <p:spPr>
+          <a:xfrm>
+            <a:off x="685799" y="4343236"/>
+            <a:ext cx="5486082" cy="4114800"/>
+          </a:xfrm>
+        </p:spPr>
+        <p:txBody>
+          <a:bodyPr/>
+          <a:lstStyle/>
+          <a:p>
+            <a:endParaRPr lang="en-US"/>
+          </a:p>
+        </p:txBody>
+      </p:sp>
+    </p:spTree>
+  </p:cSld>
+  <p:clrMapOvr>
+    <a:masterClrMapping/>
+  </p:clrMapOvr>
+</p:notes>
+</file>
+
+<file path=ppt/notesSlides/notesSlide3.xml><?xml version="1.0" encoding="utf-8"?>
+<p:notes xmlns:a="http://schemas.openxmlformats.org/drawingml/2006/main" xmlns:r="http://schemas.openxmlformats.org/officeDocument/2006/relationships" xmlns:p="http://schemas.openxmlformats.org/presentationml/2006/main">
+  <p:cSld>
+    <p:spTree>
+      <p:nvGrpSpPr>
+        <p:cNvPr id="1" name=""/>
+        <p:cNvGrpSpPr/>
+        <p:nvPr/>
+      </p:nvGrpSpPr>
+      <p:grpSpPr>
+        <a:xfrm>
+          <a:off x="0" y="0"/>
+          <a:ext cx="0" cy="0"/>
+          <a:chOff x="0" y="0"/>
+          <a:chExt cx="0" cy="0"/>
+        </a:xfrm>
+      </p:grpSpPr>
+      <p:sp>
+        <p:nvSpPr>
+          <p:cNvPr id="2" name="Slide Image Placeholder 1"/>
+          <p:cNvSpPr>
+            <a:spLocks noGrp="1" noRot="1" noChangeAspect="1" noResize="1"/>
+          </p:cNvSpPr>
+          <p:nvPr>
+            <p:ph type="sldImg"/>
+          </p:nvPr>
+        </p:nvSpPr>
+        <p:spPr>
+          <a:solidFill>
+            <a:srgbClr val="729FCF"/>
+          </a:solidFill>
+          <a:ln w="25400">
+            <a:solidFill>
+              <a:srgbClr val="3465A4"/>
+            </a:solidFill>
+            <a:prstDash val="solid"/>
+          </a:ln>
+        </p:spPr>
+      </p:sp>
+      <p:sp>
+        <p:nvSpPr>
+          <p:cNvPr id="3" name="Notes Placeholder 2"/>
+          <p:cNvSpPr txBox="1">
+            <a:spLocks noGrp="1"/>
+          </p:cNvSpPr>
+          <p:nvPr>
+            <p:ph type="body" sz="quarter" idx="1"/>
+          </p:nvPr>
+        </p:nvSpPr>
+        <p:spPr>
+          <a:xfrm>
+            <a:off x="685799" y="4343236"/>
+            <a:ext cx="5486082" cy="4114800"/>
+          </a:xfrm>
+        </p:spPr>
+        <p:txBody>
+          <a:bodyPr/>
+          <a:lstStyle/>
+          <a:p>
+            <a:endParaRPr lang="en-US"/>
+          </a:p>
+        </p:txBody>
+      </p:sp>
+    </p:spTree>
+  </p:cSld>
+  <p:clrMapOvr>
+    <a:masterClrMapping/>
+  </p:clrMapOvr>
+</p:notes>
+</file>
+
 <file path=ppt/slideLayouts/slideLayout1.xml><?xml version="1.0" encoding="utf-8"?>
 <p:sldLayout xmlns:a="http://schemas.openxmlformats.org/drawingml/2006/main" xmlns:r="http://schemas.openxmlformats.org/officeDocument/2006/relationships" xmlns:p="http://schemas.openxmlformats.org/presentationml/2006/main" type="title" preserve="1">
   <p:cSld name="Title Slide">
@@ -335,7 +908,7 @@
               <a:pPr>
                 <a:defRPr/>
               </a:pPr>
-              <a:t>1/7/2016</a:t>
+              <a:t>1/12/2016</a:t>
             </a:fld>
             <a:endParaRPr lang="en-US"/>
           </a:p>
@@ -532,7 +1105,7 @@
               <a:pPr>
                 <a:defRPr/>
               </a:pPr>
-              <a:t>1/7/2016</a:t>
+              <a:t>1/12/2016</a:t>
             </a:fld>
             <a:endParaRPr lang="en-US"/>
           </a:p>
@@ -739,7 +1312,7 @@
               <a:pPr>
                 <a:defRPr/>
               </a:pPr>
-              <a:t>1/7/2016</a:t>
+              <a:t>1/12/2016</a:t>
             </a:fld>
             <a:endParaRPr lang="en-US"/>
           </a:p>
@@ -936,7 +1509,7 @@
               <a:pPr>
                 <a:defRPr/>
               </a:pPr>
-              <a:t>1/7/2016</a:t>
+              <a:t>1/12/2016</a:t>
             </a:fld>
             <a:endParaRPr lang="en-US"/>
           </a:p>
@@ -1209,7 +1782,7 @@
               <a:pPr>
                 <a:defRPr/>
               </a:pPr>
-              <a:t>1/7/2016</a:t>
+              <a:t>1/12/2016</a:t>
             </a:fld>
             <a:endParaRPr lang="en-US"/>
           </a:p>
@@ -1524,7 +2097,7 @@
               <a:pPr>
                 <a:defRPr/>
               </a:pPr>
-              <a:t>1/7/2016</a:t>
+              <a:t>1/12/2016</a:t>
             </a:fld>
             <a:endParaRPr lang="en-US"/>
           </a:p>
@@ -1973,7 +2546,7 @@
               <a:pPr>
                 <a:defRPr/>
               </a:pPr>
-              <a:t>1/7/2016</a:t>
+              <a:t>1/12/2016</a:t>
             </a:fld>
             <a:endParaRPr lang="en-US"/>
           </a:p>
@@ -2118,7 +2691,7 @@
               <a:pPr>
                 <a:defRPr/>
               </a:pPr>
-              <a:t>1/7/2016</a:t>
+              <a:t>1/12/2016</a:t>
             </a:fld>
             <a:endParaRPr lang="en-US"/>
           </a:p>
@@ -2240,7 +2813,7 @@
               <a:pPr>
                 <a:defRPr/>
               </a:pPr>
-              <a:t>1/7/2016</a:t>
+              <a:t>1/12/2016</a:t>
             </a:fld>
             <a:endParaRPr lang="en-US"/>
           </a:p>
@@ -2544,7 +3117,7 @@
               <a:pPr>
                 <a:defRPr/>
               </a:pPr>
-              <a:t>1/7/2016</a:t>
+              <a:t>1/12/2016</a:t>
             </a:fld>
             <a:endParaRPr lang="en-US"/>
           </a:p>
@@ -2827,7 +3400,7 @@
               <a:pPr>
                 <a:defRPr/>
               </a:pPr>
-              <a:t>1/7/2016</a:t>
+              <a:t>1/12/2016</a:t>
             </a:fld>
             <a:endParaRPr lang="en-US"/>
           </a:p>
@@ -3123,7 +3696,7 @@
               <a:pPr>
                 <a:defRPr/>
               </a:pPr>
-              <a:t>1/7/2016</a:t>
+              <a:t>1/12/2016</a:t>
             </a:fld>
             <a:endParaRPr lang="en-US"/>
           </a:p>
@@ -3673,13 +4246,8 @@
             </a:br>
             <a:r>
               <a:rPr lang="en-US" altLang="nl-NL" sz="4000" dirty="0" smtClean="0"/>
-              <a:t>(</a:t>
-            </a:r>
-            <a:r>
-              <a:rPr lang="en-US" altLang="nl-NL" sz="4000" dirty="0" smtClean="0"/>
-              <a:t>2015-1-12)</a:t>
-            </a:r>
-            <a:endParaRPr lang="en-US" altLang="nl-NL" sz="4000" dirty="0" smtClean="0"/>
+              <a:t>(2015-1-12)</a:t>
+            </a:r>
           </a:p>
         </p:txBody>
       </p:sp>
@@ -3713,6 +4281,2105 @@
               <a:t>Shaun Edwards</a:t>
             </a:r>
             <a:endParaRPr lang="en-US" dirty="0"/>
+          </a:p>
+        </p:txBody>
+      </p:sp>
+    </p:spTree>
+  </p:cSld>
+  <p:clrMapOvr>
+    <a:masterClrMapping/>
+  </p:clrMapOvr>
+</p:sld>
+</file>
+
+<file path=ppt/slides/slide10.xml><?xml version="1.0" encoding="utf-8"?>
+<p:sld xmlns:a="http://schemas.openxmlformats.org/drawingml/2006/main" xmlns:r="http://schemas.openxmlformats.org/officeDocument/2006/relationships" xmlns:p="http://schemas.openxmlformats.org/presentationml/2006/main">
+  <p:cSld>
+    <p:spTree>
+      <p:nvGrpSpPr>
+        <p:cNvPr id="1" name=""/>
+        <p:cNvGrpSpPr/>
+        <p:nvPr/>
+      </p:nvGrpSpPr>
+      <p:grpSpPr>
+        <a:xfrm>
+          <a:off x="0" y="0"/>
+          <a:ext cx="0" cy="0"/>
+          <a:chOff x="0" y="0"/>
+          <a:chExt cx="0" cy="0"/>
+        </a:xfrm>
+      </p:grpSpPr>
+      <p:sp>
+        <p:nvSpPr>
+          <p:cNvPr id="16385" name="Title 1"/>
+          <p:cNvSpPr>
+            <a:spLocks noGrp="1"/>
+          </p:cNvSpPr>
+          <p:nvPr>
+            <p:ph type="title"/>
+          </p:nvPr>
+        </p:nvSpPr>
+        <p:spPr/>
+        <p:txBody>
+          <a:bodyPr/>
+          <a:lstStyle/>
+          <a:p>
+            <a:r>
+              <a:rPr lang="en-US" altLang="nl-NL" dirty="0" smtClean="0"/>
+              <a:t>Repo Status (Highlights)</a:t>
+            </a:r>
+          </a:p>
+        </p:txBody>
+      </p:sp>
+      <p:sp>
+        <p:nvSpPr>
+          <p:cNvPr id="16386" name="Content Placeholder 2"/>
+          <p:cNvSpPr>
+            <a:spLocks noGrp="1"/>
+          </p:cNvSpPr>
+          <p:nvPr>
+            <p:ph sz="half" idx="1"/>
+          </p:nvPr>
+        </p:nvSpPr>
+        <p:spPr>
+          <a:xfrm>
+            <a:off x="457200" y="1600200"/>
+            <a:ext cx="8763000" cy="4525963"/>
+          </a:xfrm>
+        </p:spPr>
+        <p:txBody>
+          <a:bodyPr/>
+          <a:lstStyle/>
+          <a:p>
+            <a:r>
+              <a:rPr lang="en-US" altLang="nl-NL" dirty="0" smtClean="0"/>
+              <a:t>Current Development</a:t>
+            </a:r>
+          </a:p>
+          <a:p>
+            <a:pPr lvl="1"/>
+            <a:r>
+              <a:rPr lang="en-US" altLang="nl-NL" sz="2400" dirty="0" smtClean="0"/>
+              <a:t>Project Manager Plugin</a:t>
+            </a:r>
+          </a:p>
+          <a:p>
+            <a:pPr lvl="2"/>
+            <a:r>
+              <a:rPr lang="en-US" altLang="nl-NL" sz="2000" dirty="0" smtClean="0"/>
+              <a:t>Import project</a:t>
+            </a:r>
+          </a:p>
+          <a:p>
+            <a:pPr lvl="2"/>
+            <a:r>
+              <a:rPr lang="en-US" altLang="nl-NL" dirty="0" smtClean="0"/>
+              <a:t>Build Configuration</a:t>
+            </a:r>
+            <a:endParaRPr lang="en-US" altLang="nl-NL" sz="2400" dirty="0" smtClean="0"/>
+          </a:p>
+          <a:p>
+            <a:r>
+              <a:rPr lang="en-US" altLang="nl-NL" dirty="0" smtClean="0"/>
+              <a:t>Upcoming Development</a:t>
+            </a:r>
+          </a:p>
+          <a:p>
+            <a:pPr lvl="1"/>
+            <a:r>
+              <a:rPr lang="en-US" altLang="nl-NL" sz="2400" dirty="0" smtClean="0"/>
+              <a:t>Project Manger Plugin</a:t>
+            </a:r>
+          </a:p>
+          <a:p>
+            <a:pPr lvl="2"/>
+            <a:r>
+              <a:rPr lang="en-US" altLang="nl-NL" sz="2000" dirty="0" smtClean="0"/>
+              <a:t>Run Configuration</a:t>
+            </a:r>
+          </a:p>
+          <a:p>
+            <a:pPr lvl="1"/>
+            <a:r>
+              <a:rPr lang="en-US" altLang="nl-NL" sz="2400" dirty="0" smtClean="0"/>
+              <a:t>ROS Template Plugin</a:t>
+            </a:r>
+          </a:p>
+          <a:p>
+            <a:pPr marL="457200" lvl="1" indent="0">
+              <a:buNone/>
+            </a:pPr>
+            <a:endParaRPr lang="en-US" altLang="nl-NL" sz="1200" dirty="0" smtClean="0"/>
+          </a:p>
+          <a:p>
+            <a:pPr marL="0" indent="0">
+              <a:buNone/>
+            </a:pPr>
+            <a:r>
+              <a:rPr lang="en-US" altLang="nl-NL" sz="1800" dirty="0"/>
+              <a:t>Repo: </a:t>
+            </a:r>
+            <a:r>
+              <a:rPr lang="en-US" altLang="nl-NL" sz="1800" dirty="0">
+                <a:hlinkClick r:id="rId2"/>
+              </a:rPr>
+              <a:t>https://</a:t>
+            </a:r>
+            <a:r>
+              <a:rPr lang="en-US" altLang="nl-NL" sz="1800" dirty="0" smtClean="0">
+                <a:hlinkClick r:id="rId2"/>
+              </a:rPr>
+              <a:t>github.com/Levi-Armstrong/ros_qtc_plugins</a:t>
+            </a:r>
+            <a:endParaRPr lang="en-US" altLang="nl-NL" sz="1800" dirty="0" smtClean="0"/>
+          </a:p>
+          <a:p>
+            <a:pPr marL="0" indent="0">
+              <a:buNone/>
+            </a:pPr>
+            <a:r>
+              <a:rPr lang="en-US" altLang="nl-NL" sz="1800" dirty="0" smtClean="0"/>
+              <a:t>Ideas: </a:t>
+            </a:r>
+            <a:r>
+              <a:rPr lang="en-US" altLang="nl-NL" sz="1800" dirty="0">
+                <a:hlinkClick r:id="rId3"/>
+              </a:rPr>
+              <a:t>https://</a:t>
+            </a:r>
+            <a:r>
+              <a:rPr lang="en-US" altLang="nl-NL" sz="1800" dirty="0" smtClean="0">
+                <a:hlinkClick r:id="rId3"/>
+              </a:rPr>
+              <a:t>github.com/Levi-Armstrong/ros_qtc_plugins/issues/3</a:t>
+            </a:r>
+            <a:endParaRPr lang="en-US" altLang="nl-NL" sz="1800" dirty="0" smtClean="0"/>
+          </a:p>
+          <a:p>
+            <a:pPr marL="0" indent="0">
+              <a:buNone/>
+            </a:pPr>
+            <a:r>
+              <a:rPr lang="en-US" altLang="nl-NL" sz="1800" dirty="0"/>
+              <a:t>Setup: </a:t>
+            </a:r>
+            <a:r>
+              <a:rPr lang="en-US" altLang="nl-NL" sz="1800" dirty="0">
+                <a:hlinkClick r:id="rId4"/>
+              </a:rPr>
+              <a:t>https://github.com/Levi-Armstrong/ros_qtc_plugins/wiki/Setup-for-development</a:t>
+            </a:r>
+            <a:r>
+              <a:rPr lang="en-US" altLang="nl-NL" sz="1800" dirty="0" smtClean="0"/>
+              <a:t>.   </a:t>
+            </a:r>
+          </a:p>
+        </p:txBody>
+      </p:sp>
+      <p:pic>
+        <p:nvPicPr>
+          <p:cNvPr id="3074" name="Picture 2" descr="R:\AES\Armstrong\new_file.png"/>
+          <p:cNvPicPr>
+            <a:picLocks noChangeAspect="1" noChangeArrowheads="1"/>
+          </p:cNvPicPr>
+          <p:nvPr/>
+        </p:nvPicPr>
+        <p:blipFill>
+          <a:blip r:embed="rId5" cstate="print">
+            <a:extLst>
+              <a:ext uri="{28A0092B-C50C-407E-A947-70E740481C1C}">
+                <a14:useLocalDpi xmlns="" xmlns:a14="http://schemas.microsoft.com/office/drawing/2010/main" val="0"/>
+              </a:ext>
+            </a:extLst>
+          </a:blip>
+          <a:srcRect/>
+          <a:stretch>
+            <a:fillRect/>
+          </a:stretch>
+        </p:blipFill>
+        <p:spPr bwMode="auto">
+          <a:xfrm>
+            <a:off x="4423077" y="1800397"/>
+            <a:ext cx="4616727" cy="2874962"/>
+          </a:xfrm>
+          <a:prstGeom prst="rect">
+            <a:avLst/>
+          </a:prstGeom>
+          <a:noFill/>
+          <a:extLst>
+            <a:ext uri="{909E8E84-426E-40DD-AFC4-6F175D3DCCD1}">
+              <a14:hiddenFill xmlns="" xmlns:a14="http://schemas.microsoft.com/office/drawing/2010/main">
+                <a:solidFill>
+                  <a:srgbClr val="FFFFFF"/>
+                </a:solidFill>
+              </a14:hiddenFill>
+            </a:ext>
+          </a:extLst>
+        </p:spPr>
+      </p:pic>
+    </p:spTree>
+  </p:cSld>
+  <p:clrMapOvr>
+    <a:masterClrMapping/>
+  </p:clrMapOvr>
+</p:sld>
+</file>
+
+<file path=ppt/slides/slide11.xml><?xml version="1.0" encoding="utf-8"?>
+<p:sld xmlns:a="http://schemas.openxmlformats.org/drawingml/2006/main" xmlns:r="http://schemas.openxmlformats.org/officeDocument/2006/relationships" xmlns:p="http://schemas.openxmlformats.org/presentationml/2006/main">
+  <p:cSld>
+    <p:spTree>
+      <p:nvGrpSpPr>
+        <p:cNvPr id="1" name=""/>
+        <p:cNvGrpSpPr/>
+        <p:nvPr/>
+      </p:nvGrpSpPr>
+      <p:grpSpPr>
+        <a:xfrm>
+          <a:off x="0" y="0"/>
+          <a:ext cx="0" cy="0"/>
+          <a:chOff x="0" y="0"/>
+          <a:chExt cx="0" cy="0"/>
+        </a:xfrm>
+      </p:grpSpPr>
+      <p:sp>
+        <p:nvSpPr>
+          <p:cNvPr id="4" name="Title 3"/>
+          <p:cNvSpPr>
+            <a:spLocks noGrp="1"/>
+          </p:cNvSpPr>
+          <p:nvPr>
+            <p:ph type="title"/>
+          </p:nvPr>
+        </p:nvSpPr>
+        <p:spPr/>
+        <p:txBody>
+          <a:bodyPr/>
+          <a:lstStyle/>
+          <a:p>
+            <a:r>
+              <a:rPr lang="en-US" dirty="0" err="1" smtClean="0"/>
+              <a:t>Machinekit</a:t>
+            </a:r>
+            <a:r>
+              <a:rPr lang="en-US" dirty="0" smtClean="0"/>
+              <a:t> &amp; ROS-Industrial</a:t>
+            </a:r>
+            <a:br>
+              <a:rPr lang="en-US" dirty="0" smtClean="0"/>
+            </a:br>
+            <a:r>
+              <a:rPr lang="en-US" dirty="0" smtClean="0"/>
+              <a:t>(2015-1-12)</a:t>
+            </a:r>
+            <a:endParaRPr lang="en-US" dirty="0"/>
+          </a:p>
+        </p:txBody>
+      </p:sp>
+      <p:sp>
+        <p:nvSpPr>
+          <p:cNvPr id="5" name="Text Placeholder 4"/>
+          <p:cNvSpPr>
+            <a:spLocks noGrp="1"/>
+          </p:cNvSpPr>
+          <p:nvPr>
+            <p:ph type="body" idx="1"/>
+          </p:nvPr>
+        </p:nvSpPr>
+        <p:spPr/>
+        <p:txBody>
+          <a:bodyPr/>
+          <a:lstStyle/>
+          <a:p>
+            <a:pPr lvl="0">
+              <a:spcBef>
+                <a:spcPts val="641"/>
+              </a:spcBef>
+              <a:spcAft>
+                <a:spcPts val="0"/>
+              </a:spcAft>
+              <a:tabLst>
+                <a:tab pos="0" algn="l"/>
+              </a:tabLst>
+            </a:pPr>
+            <a:r>
+              <a:rPr lang="en-US" dirty="0" smtClean="0">
+                <a:solidFill>
+                  <a:srgbClr val="8B8B8B"/>
+                </a:solidFill>
+                <a:latin typeface="Calibri" pitchFamily="18"/>
+                <a:cs typeface="Mangal" pitchFamily="2"/>
+              </a:rPr>
+              <a:t> Charles Steinkuehler</a:t>
+            </a:r>
+            <a:endParaRPr lang="en-US" dirty="0">
+              <a:solidFill>
+                <a:srgbClr val="8B8B8B"/>
+              </a:solidFill>
+              <a:latin typeface="Calibri" pitchFamily="18"/>
+              <a:cs typeface="Mangal" pitchFamily="2"/>
+            </a:endParaRPr>
+          </a:p>
+        </p:txBody>
+      </p:sp>
+    </p:spTree>
+  </p:cSld>
+  <p:clrMapOvr>
+    <a:masterClrMapping/>
+  </p:clrMapOvr>
+</p:sld>
+</file>
+
+<file path=ppt/slides/slide12.xml><?xml version="1.0" encoding="utf-8"?>
+<p:sld xmlns:a="http://schemas.openxmlformats.org/drawingml/2006/main" xmlns:r="http://schemas.openxmlformats.org/officeDocument/2006/relationships" xmlns:p="http://schemas.openxmlformats.org/presentationml/2006/main">
+  <p:cSld>
+    <p:spTree>
+      <p:nvGrpSpPr>
+        <p:cNvPr id="1" name=""/>
+        <p:cNvGrpSpPr/>
+        <p:nvPr/>
+      </p:nvGrpSpPr>
+      <p:grpSpPr>
+        <a:xfrm>
+          <a:off x="0" y="0"/>
+          <a:ext cx="0" cy="0"/>
+          <a:chOff x="0" y="0"/>
+          <a:chExt cx="0" cy="0"/>
+        </a:xfrm>
+      </p:grpSpPr>
+      <p:sp>
+        <p:nvSpPr>
+          <p:cNvPr id="2" name="Title 1"/>
+          <p:cNvSpPr txBox="1">
+            <a:spLocks noGrp="1"/>
+          </p:cNvSpPr>
+          <p:nvPr>
+            <p:ph type="title" idx="4294967295"/>
+          </p:nvPr>
+        </p:nvSpPr>
+        <p:spPr/>
+        <p:txBody>
+          <a:bodyPr/>
+          <a:lstStyle>
+            <a:defPPr lvl="0">
+              <a:buSzPct val="45000"/>
+              <a:buFont typeface="StarSymbol"/>
+              <a:buNone/>
+            </a:defPPr>
+            <a:lvl1pPr lvl="0">
+              <a:buSzPct val="45000"/>
+              <a:buFont typeface="StarSymbol"/>
+              <a:buChar char="●"/>
+            </a:lvl1pPr>
+            <a:lvl2pPr lvl="1">
+              <a:buSzPct val="45000"/>
+              <a:buFont typeface="StarSymbol"/>
+              <a:buChar char="●"/>
+            </a:lvl2pPr>
+            <a:lvl3pPr lvl="2">
+              <a:buSzPct val="45000"/>
+              <a:buFont typeface="StarSymbol"/>
+              <a:buChar char="●"/>
+            </a:lvl3pPr>
+            <a:lvl4pPr lvl="3">
+              <a:buSzPct val="45000"/>
+              <a:buFont typeface="StarSymbol"/>
+              <a:buChar char="●"/>
+            </a:lvl4pPr>
+            <a:lvl5pPr lvl="4">
+              <a:buSzPct val="45000"/>
+              <a:buFont typeface="StarSymbol"/>
+              <a:buChar char="●"/>
+            </a:lvl5pPr>
+            <a:lvl6pPr lvl="5">
+              <a:buSzPct val="45000"/>
+              <a:buFont typeface="StarSymbol"/>
+              <a:buChar char="●"/>
+            </a:lvl6pPr>
+            <a:lvl7pPr lvl="6">
+              <a:buSzPct val="45000"/>
+              <a:buFont typeface="StarSymbol"/>
+              <a:buChar char="●"/>
+            </a:lvl7pPr>
+            <a:lvl8pPr lvl="7">
+              <a:buSzPct val="45000"/>
+              <a:buFont typeface="StarSymbol"/>
+              <a:buChar char="●"/>
+            </a:lvl8pPr>
+            <a:lvl9pPr lvl="8">
+              <a:buSzPct val="45000"/>
+              <a:buFont typeface="StarSymbol"/>
+              <a:buChar char="●"/>
+            </a:lvl9pPr>
+          </a:lstStyle>
+          <a:p>
+            <a:pPr lvl="0">
+              <a:buNone/>
+            </a:pPr>
+            <a:r>
+              <a:rPr lang="en-US"/>
+              <a:t>Machinekit HAL</a:t>
+            </a:r>
+          </a:p>
+        </p:txBody>
+      </p:sp>
+      <p:sp>
+        <p:nvSpPr>
+          <p:cNvPr id="3" name="Content Placeholder 2"/>
+          <p:cNvSpPr txBox="1">
+            <a:spLocks noGrp="1"/>
+          </p:cNvSpPr>
+          <p:nvPr>
+            <p:ph type="body" idx="4294967295"/>
+          </p:nvPr>
+        </p:nvSpPr>
+        <p:spPr/>
+        <p:txBody>
+          <a:bodyPr/>
+          <a:lstStyle>
+            <a:defPPr marL="432000" lvl="0" indent="-324000" algn="l" rtl="0">
+              <a:lnSpc>
+                <a:spcPct val="100000"/>
+              </a:lnSpc>
+              <a:spcBef>
+                <a:spcPts val="0"/>
+              </a:spcBef>
+              <a:spcAft>
+                <a:spcPts val="1417"/>
+              </a:spcAft>
+              <a:buSzPct val="45000"/>
+              <a:buFont typeface="StarSymbol"/>
+              <a:buNone/>
+              <a:defRPr lang="en-US" sz="3200" b="0" i="0" u="none" strike="noStrike" kern="1200" cap="none" spc="0">
+                <a:ln>
+                  <a:noFill/>
+                </a:ln>
+                <a:solidFill>
+                  <a:srgbClr val="000000"/>
+                </a:solidFill>
+                <a:latin typeface="Calibri"/>
+                <a:ea typeface="Microsoft YaHei" pitchFamily="2"/>
+                <a:cs typeface="Arial"/>
+              </a:defRPr>
+            </a:defPPr>
+            <a:lvl1pPr marL="432000" lvl="0" indent="-324000" algn="l" rtl="0">
+              <a:lnSpc>
+                <a:spcPct val="100000"/>
+              </a:lnSpc>
+              <a:spcBef>
+                <a:spcPts val="0"/>
+              </a:spcBef>
+              <a:spcAft>
+                <a:spcPts val="1417"/>
+              </a:spcAft>
+              <a:buSzPct val="45000"/>
+              <a:buFont typeface="StarSymbol"/>
+              <a:buChar char="●"/>
+              <a:defRPr lang="en-US" sz="3200" b="0" i="0" u="none" strike="noStrike" kern="1200" cap="none" spc="0">
+                <a:ln>
+                  <a:noFill/>
+                </a:ln>
+                <a:solidFill>
+                  <a:srgbClr val="000000"/>
+                </a:solidFill>
+                <a:latin typeface="Calibri"/>
+                <a:ea typeface="Microsoft YaHei" pitchFamily="2"/>
+                <a:cs typeface="Arial"/>
+              </a:defRPr>
+            </a:lvl1pPr>
+            <a:lvl2pPr marL="864000" lvl="1" indent="-324000" algn="l" rtl="0">
+              <a:lnSpc>
+                <a:spcPct val="100000"/>
+              </a:lnSpc>
+              <a:spcBef>
+                <a:spcPts val="0"/>
+              </a:spcBef>
+              <a:spcAft>
+                <a:spcPts val="1134"/>
+              </a:spcAft>
+              <a:buSzPct val="75000"/>
+              <a:buFont typeface="StarSymbol"/>
+              <a:buChar char="–"/>
+              <a:defRPr lang="en-US" sz="2400" b="0" i="0" u="none" strike="noStrike" kern="1200" cap="none" spc="0">
+                <a:ln>
+                  <a:noFill/>
+                </a:ln>
+                <a:solidFill>
+                  <a:srgbClr val="000000"/>
+                </a:solidFill>
+                <a:latin typeface="Calibri"/>
+                <a:ea typeface="Microsoft YaHei" pitchFamily="2"/>
+                <a:cs typeface="Arial"/>
+              </a:defRPr>
+            </a:lvl2pPr>
+            <a:lvl3pPr marL="1295999" lvl="2" indent="-288000" algn="l" rtl="0">
+              <a:lnSpc>
+                <a:spcPct val="100000"/>
+              </a:lnSpc>
+              <a:spcBef>
+                <a:spcPts val="0"/>
+              </a:spcBef>
+              <a:spcAft>
+                <a:spcPts val="850"/>
+              </a:spcAft>
+              <a:buSzPct val="45000"/>
+              <a:buFont typeface="StarSymbol"/>
+              <a:buChar char="●"/>
+              <a:defRPr lang="en-US" sz="2000" b="0" i="0" u="none" strike="noStrike" kern="1200" cap="none" spc="0">
+                <a:ln>
+                  <a:noFill/>
+                </a:ln>
+                <a:solidFill>
+                  <a:srgbClr val="000000"/>
+                </a:solidFill>
+                <a:latin typeface="Calibri"/>
+                <a:ea typeface="Microsoft YaHei" pitchFamily="2"/>
+                <a:cs typeface="Arial"/>
+              </a:defRPr>
+            </a:lvl3pPr>
+            <a:lvl4pPr marL="1728000" lvl="3" indent="-216000" algn="l" rtl="0">
+              <a:lnSpc>
+                <a:spcPct val="100000"/>
+              </a:lnSpc>
+              <a:spcBef>
+                <a:spcPts val="0"/>
+              </a:spcBef>
+              <a:spcAft>
+                <a:spcPts val="567"/>
+              </a:spcAft>
+              <a:buSzPct val="75000"/>
+              <a:buFont typeface="StarSymbol"/>
+              <a:buChar char="–"/>
+              <a:defRPr lang="en-US" sz="2000" b="0" i="0" u="none" strike="noStrike" kern="1200" cap="none" spc="0">
+                <a:ln>
+                  <a:noFill/>
+                </a:ln>
+                <a:solidFill>
+                  <a:srgbClr val="000000"/>
+                </a:solidFill>
+                <a:latin typeface="Calibri"/>
+                <a:ea typeface="Microsoft YaHei" pitchFamily="2"/>
+                <a:cs typeface="Arial"/>
+              </a:defRPr>
+            </a:lvl4pPr>
+            <a:lvl5pPr marL="2160000" lvl="4" indent="-216000" algn="l" rtl="0">
+              <a:lnSpc>
+                <a:spcPct val="100000"/>
+              </a:lnSpc>
+              <a:spcBef>
+                <a:spcPts val="0"/>
+              </a:spcBef>
+              <a:spcAft>
+                <a:spcPts val="283"/>
+              </a:spcAft>
+              <a:buSzPct val="45000"/>
+              <a:buFont typeface="StarSymbol"/>
+              <a:buChar char="●"/>
+              <a:defRPr lang="en-US" sz="2000" b="0" i="0" u="none" strike="noStrike" kern="1200" cap="none" spc="0">
+                <a:ln>
+                  <a:noFill/>
+                </a:ln>
+                <a:solidFill>
+                  <a:srgbClr val="000000"/>
+                </a:solidFill>
+                <a:latin typeface="Calibri"/>
+                <a:ea typeface="Microsoft YaHei" pitchFamily="2"/>
+                <a:cs typeface="Arial"/>
+              </a:defRPr>
+            </a:lvl5pPr>
+            <a:lvl6pPr marL="2592000" lvl="5" indent="-216000" algn="l" rtl="0">
+              <a:lnSpc>
+                <a:spcPct val="100000"/>
+              </a:lnSpc>
+              <a:spcBef>
+                <a:spcPts val="0"/>
+              </a:spcBef>
+              <a:spcAft>
+                <a:spcPts val="283"/>
+              </a:spcAft>
+              <a:buSzPct val="45000"/>
+              <a:buFont typeface="StarSymbol"/>
+              <a:buChar char="●"/>
+              <a:defRPr lang="en-US" sz="2000" b="0" i="0" u="none" strike="noStrike" kern="1200" cap="none" spc="0">
+                <a:ln>
+                  <a:noFill/>
+                </a:ln>
+                <a:solidFill>
+                  <a:srgbClr val="000000"/>
+                </a:solidFill>
+                <a:latin typeface="Calibri"/>
+                <a:ea typeface="Microsoft YaHei" pitchFamily="2"/>
+                <a:cs typeface="Arial"/>
+              </a:defRPr>
+            </a:lvl6pPr>
+            <a:lvl7pPr marL="3024000" lvl="6" indent="-216000" algn="l" rtl="0">
+              <a:lnSpc>
+                <a:spcPct val="100000"/>
+              </a:lnSpc>
+              <a:spcBef>
+                <a:spcPts val="0"/>
+              </a:spcBef>
+              <a:spcAft>
+                <a:spcPts val="283"/>
+              </a:spcAft>
+              <a:buSzPct val="45000"/>
+              <a:buFont typeface="StarSymbol"/>
+              <a:buChar char="●"/>
+              <a:defRPr lang="en-US" sz="2000" b="0" i="0" u="none" strike="noStrike" kern="1200" cap="none" spc="0">
+                <a:ln>
+                  <a:noFill/>
+                </a:ln>
+                <a:solidFill>
+                  <a:srgbClr val="000000"/>
+                </a:solidFill>
+                <a:latin typeface="Calibri"/>
+                <a:ea typeface="Microsoft YaHei" pitchFamily="2"/>
+                <a:cs typeface="Arial"/>
+              </a:defRPr>
+            </a:lvl7pPr>
+            <a:lvl8pPr marL="3456000" lvl="7" indent="-216000" algn="l" rtl="0">
+              <a:lnSpc>
+                <a:spcPct val="100000"/>
+              </a:lnSpc>
+              <a:spcBef>
+                <a:spcPts val="0"/>
+              </a:spcBef>
+              <a:spcAft>
+                <a:spcPts val="283"/>
+              </a:spcAft>
+              <a:buSzPct val="45000"/>
+              <a:buFont typeface="StarSymbol"/>
+              <a:buChar char="●"/>
+              <a:defRPr lang="en-US" sz="2000" b="0" i="0" u="none" strike="noStrike" kern="1200" cap="none" spc="0">
+                <a:ln>
+                  <a:noFill/>
+                </a:ln>
+                <a:solidFill>
+                  <a:srgbClr val="000000"/>
+                </a:solidFill>
+                <a:latin typeface="Calibri"/>
+                <a:ea typeface="Microsoft YaHei" pitchFamily="2"/>
+                <a:cs typeface="Arial"/>
+              </a:defRPr>
+            </a:lvl8pPr>
+            <a:lvl9pPr marL="3887999" lvl="8" indent="-216000" algn="l" rtl="0">
+              <a:lnSpc>
+                <a:spcPct val="100000"/>
+              </a:lnSpc>
+              <a:spcBef>
+                <a:spcPts val="0"/>
+              </a:spcBef>
+              <a:spcAft>
+                <a:spcPts val="283"/>
+              </a:spcAft>
+              <a:buSzPct val="45000"/>
+              <a:buFont typeface="StarSymbol"/>
+              <a:buChar char="●"/>
+              <a:defRPr lang="en-US" sz="2000" b="0" i="0" u="none" strike="noStrike" kern="1200" cap="none" spc="0">
+                <a:ln>
+                  <a:noFill/>
+                </a:ln>
+                <a:solidFill>
+                  <a:srgbClr val="000000"/>
+                </a:solidFill>
+                <a:latin typeface="Calibri"/>
+                <a:ea typeface="Microsoft YaHei" pitchFamily="2"/>
+                <a:cs typeface="Arial"/>
+              </a:defRPr>
+            </a:lvl9pPr>
+          </a:lstStyle>
+          <a:p>
+            <a:pPr marL="0" lvl="0" indent="0">
+              <a:spcBef>
+                <a:spcPts val="641"/>
+              </a:spcBef>
+              <a:spcAft>
+                <a:spcPts val="0"/>
+              </a:spcAft>
+              <a:buClr>
+                <a:srgbClr val="000000"/>
+              </a:buClr>
+              <a:buSzPct val="100000"/>
+              <a:buFont typeface="Arial" pitchFamily="34"/>
+              <a:buChar char="•"/>
+            </a:pPr>
+            <a:r>
+              <a:rPr lang="en-US" sz="2400" dirty="0"/>
+              <a:t>Virtual electronics lab-bench with real-world physical I/O</a:t>
+            </a:r>
+          </a:p>
+          <a:p>
+            <a:pPr marL="431999" lvl="2" indent="0"/>
+            <a:r>
+              <a:rPr lang="en-US" sz="1800" dirty="0"/>
+              <a:t>Lots of stock components (PID, </a:t>
+            </a:r>
+            <a:r>
+              <a:rPr lang="en-US" sz="1800" dirty="0" err="1"/>
+              <a:t>stepgen</a:t>
+            </a:r>
+            <a:r>
+              <a:rPr lang="en-US" sz="1800" dirty="0"/>
+              <a:t>, </a:t>
+            </a:r>
+            <a:r>
+              <a:rPr lang="en-US" sz="1800" dirty="0" err="1"/>
+              <a:t>debounce</a:t>
+            </a:r>
+            <a:r>
+              <a:rPr lang="en-US" sz="1800" dirty="0"/>
+              <a:t>, filters, etc)</a:t>
+            </a:r>
+          </a:p>
+          <a:p>
+            <a:pPr marL="431999" lvl="2" indent="0"/>
+            <a:r>
+              <a:rPr lang="en-US" sz="1800" dirty="0"/>
+              <a:t>Virtual wires (atomic values in shared memory)</a:t>
+            </a:r>
+          </a:p>
+          <a:p>
+            <a:pPr marL="431999" lvl="2" indent="0"/>
+            <a:r>
+              <a:rPr lang="en-US" sz="1800" dirty="0"/>
+              <a:t>Test equipment (</a:t>
+            </a:r>
+            <a:r>
+              <a:rPr lang="en-US" sz="1800" dirty="0" err="1"/>
+              <a:t>HALScope</a:t>
+            </a:r>
+            <a:r>
+              <a:rPr lang="en-US" sz="1800" dirty="0"/>
+              <a:t>, </a:t>
+            </a:r>
+            <a:r>
+              <a:rPr lang="en-US" sz="1800" dirty="0" err="1"/>
+              <a:t>HALMeter</a:t>
+            </a:r>
+            <a:r>
+              <a:rPr lang="en-US" sz="1800" dirty="0"/>
+              <a:t>)</a:t>
+            </a:r>
+          </a:p>
+          <a:p>
+            <a:pPr marL="0" lvl="0" indent="0">
+              <a:spcBef>
+                <a:spcPts val="641"/>
+              </a:spcBef>
+              <a:spcAft>
+                <a:spcPts val="0"/>
+              </a:spcAft>
+              <a:buClr>
+                <a:srgbClr val="000000"/>
+              </a:buClr>
+              <a:buSzPct val="100000"/>
+              <a:buFont typeface="Arial" pitchFamily="34"/>
+              <a:buChar char="•"/>
+            </a:pPr>
+            <a:r>
+              <a:rPr lang="en-US" sz="2400" dirty="0"/>
+              <a:t>Dynamic environment – No Compiling!</a:t>
+            </a:r>
+          </a:p>
+          <a:p>
+            <a:pPr marL="431999" lvl="2" indent="0"/>
+            <a:r>
+              <a:rPr lang="en-US" sz="1800" dirty="0"/>
+              <a:t>Components and signals can be added and deleted at run-time</a:t>
+            </a:r>
+          </a:p>
+          <a:p>
+            <a:pPr marL="431999" lvl="2" indent="0"/>
+            <a:r>
+              <a:rPr lang="en-US" sz="1800" dirty="0"/>
+              <a:t>Python and C bindings to create and interact with HAL objects</a:t>
+            </a:r>
+          </a:p>
+          <a:p>
+            <a:pPr marL="0" lvl="0" indent="0">
+              <a:spcBef>
+                <a:spcPts val="641"/>
+              </a:spcBef>
+              <a:spcAft>
+                <a:spcPts val="0"/>
+              </a:spcAft>
+              <a:buClr>
+                <a:srgbClr val="000000"/>
+              </a:buClr>
+              <a:buSzPct val="100000"/>
+              <a:buFont typeface="Arial" pitchFamily="34"/>
+              <a:buChar char="•"/>
+            </a:pPr>
+            <a:r>
+              <a:rPr lang="en-US" sz="2400" dirty="0"/>
+              <a:t>Real-world connectivity to physical signals</a:t>
+            </a:r>
+          </a:p>
+          <a:p>
+            <a:pPr marL="431999" lvl="2" indent="0"/>
+            <a:r>
+              <a:rPr lang="en-US" sz="1800" dirty="0"/>
+              <a:t>Step/direction, Encoders, PWM, GPIO, and other I/O available</a:t>
+            </a:r>
+          </a:p>
+          <a:p>
+            <a:pPr marL="431999" lvl="2" indent="0"/>
+            <a:r>
+              <a:rPr lang="en-US" sz="1800" dirty="0"/>
+              <a:t>x86 support for LPT and “smart” FPGA I/O cards (Open Source VHDL!)</a:t>
+            </a:r>
+          </a:p>
+          <a:p>
+            <a:pPr marL="431999" lvl="2" indent="0"/>
+            <a:r>
+              <a:rPr lang="en-US" sz="1800" dirty="0" err="1"/>
+              <a:t>BeagleBone</a:t>
+            </a:r>
+            <a:r>
+              <a:rPr lang="en-US" sz="1800" dirty="0"/>
+              <a:t> supports GPIO driven by PRU for fine-grained timings</a:t>
+            </a:r>
+          </a:p>
+          <a:p>
+            <a:pPr marL="0" lvl="0" indent="0">
+              <a:buClr>
+                <a:srgbClr val="000000"/>
+              </a:buClr>
+              <a:buSzPct val="100000"/>
+              <a:buFont typeface="Arial" pitchFamily="34"/>
+              <a:buChar char="•"/>
+            </a:pPr>
+            <a:r>
+              <a:rPr lang="en-US" sz="2400" dirty="0"/>
+              <a:t>Can run without hardware in a simulated environment for testing</a:t>
+            </a:r>
+          </a:p>
+        </p:txBody>
+      </p:sp>
+    </p:spTree>
+  </p:cSld>
+  <p:clrMapOvr>
+    <a:masterClrMapping/>
+  </p:clrMapOvr>
+  <p:transition/>
+  <p:timing>
+    <p:tnLst>
+      <p:par>
+        <p:cTn id="1" dur="indefinite" restart="never" nodeType="tmRoot"/>
+      </p:par>
+    </p:tnLst>
+  </p:timing>
+</p:sld>
+</file>
+
+<file path=ppt/slides/slide13.xml><?xml version="1.0" encoding="utf-8"?>
+<p:sld xmlns:a="http://schemas.openxmlformats.org/drawingml/2006/main" xmlns:r="http://schemas.openxmlformats.org/officeDocument/2006/relationships" xmlns:p="http://schemas.openxmlformats.org/presentationml/2006/main">
+  <p:cSld>
+    <p:spTree>
+      <p:nvGrpSpPr>
+        <p:cNvPr id="1" name=""/>
+        <p:cNvGrpSpPr/>
+        <p:nvPr/>
+      </p:nvGrpSpPr>
+      <p:grpSpPr>
+        <a:xfrm>
+          <a:off x="0" y="0"/>
+          <a:ext cx="0" cy="0"/>
+          <a:chOff x="0" y="0"/>
+          <a:chExt cx="0" cy="0"/>
+        </a:xfrm>
+      </p:grpSpPr>
+      <p:sp>
+        <p:nvSpPr>
+          <p:cNvPr id="2" name="Title 1"/>
+          <p:cNvSpPr txBox="1">
+            <a:spLocks noGrp="1"/>
+          </p:cNvSpPr>
+          <p:nvPr>
+            <p:ph type="title" idx="4294967295"/>
+          </p:nvPr>
+        </p:nvSpPr>
+        <p:spPr/>
+        <p:txBody>
+          <a:bodyPr/>
+          <a:lstStyle>
+            <a:defPPr lvl="0">
+              <a:buSzPct val="45000"/>
+              <a:buFont typeface="StarSymbol"/>
+              <a:buNone/>
+            </a:defPPr>
+            <a:lvl1pPr lvl="0">
+              <a:buSzPct val="45000"/>
+              <a:buFont typeface="StarSymbol"/>
+              <a:buChar char="●"/>
+            </a:lvl1pPr>
+            <a:lvl2pPr lvl="1">
+              <a:buSzPct val="45000"/>
+              <a:buFont typeface="StarSymbol"/>
+              <a:buChar char="●"/>
+            </a:lvl2pPr>
+            <a:lvl3pPr lvl="2">
+              <a:buSzPct val="45000"/>
+              <a:buFont typeface="StarSymbol"/>
+              <a:buChar char="●"/>
+            </a:lvl3pPr>
+            <a:lvl4pPr lvl="3">
+              <a:buSzPct val="45000"/>
+              <a:buFont typeface="StarSymbol"/>
+              <a:buChar char="●"/>
+            </a:lvl4pPr>
+            <a:lvl5pPr lvl="4">
+              <a:buSzPct val="45000"/>
+              <a:buFont typeface="StarSymbol"/>
+              <a:buChar char="●"/>
+            </a:lvl5pPr>
+            <a:lvl6pPr lvl="5">
+              <a:buSzPct val="45000"/>
+              <a:buFont typeface="StarSymbol"/>
+              <a:buChar char="●"/>
+            </a:lvl6pPr>
+            <a:lvl7pPr lvl="6">
+              <a:buSzPct val="45000"/>
+              <a:buFont typeface="StarSymbol"/>
+              <a:buChar char="●"/>
+            </a:lvl7pPr>
+            <a:lvl8pPr lvl="7">
+              <a:buSzPct val="45000"/>
+              <a:buFont typeface="StarSymbol"/>
+              <a:buChar char="●"/>
+            </a:lvl8pPr>
+            <a:lvl9pPr lvl="8">
+              <a:buSzPct val="45000"/>
+              <a:buFont typeface="StarSymbol"/>
+              <a:buChar char="●"/>
+            </a:lvl9pPr>
+          </a:lstStyle>
+          <a:p>
+            <a:pPr lvl="0">
+              <a:buNone/>
+            </a:pPr>
+            <a:r>
+              <a:rPr lang="en-US"/>
+              <a:t>Connecting ROS to Machinekit</a:t>
+            </a:r>
+          </a:p>
+        </p:txBody>
+      </p:sp>
+      <p:sp>
+        <p:nvSpPr>
+          <p:cNvPr id="3" name="Content Placeholder 2"/>
+          <p:cNvSpPr txBox="1">
+            <a:spLocks noGrp="1"/>
+          </p:cNvSpPr>
+          <p:nvPr>
+            <p:ph type="body" idx="4294967295"/>
+          </p:nvPr>
+        </p:nvSpPr>
+        <p:spPr/>
+        <p:txBody>
+          <a:bodyPr/>
+          <a:lstStyle>
+            <a:defPPr marL="432000" lvl="0" indent="-324000" algn="l" rtl="0">
+              <a:lnSpc>
+                <a:spcPct val="100000"/>
+              </a:lnSpc>
+              <a:spcBef>
+                <a:spcPts val="0"/>
+              </a:spcBef>
+              <a:spcAft>
+                <a:spcPts val="1417"/>
+              </a:spcAft>
+              <a:buSzPct val="45000"/>
+              <a:buFont typeface="StarSymbol"/>
+              <a:buNone/>
+              <a:defRPr lang="en-US" sz="3200" b="0" i="0" u="none" strike="noStrike" kern="1200" cap="none" spc="0">
+                <a:ln>
+                  <a:noFill/>
+                </a:ln>
+                <a:solidFill>
+                  <a:srgbClr val="000000"/>
+                </a:solidFill>
+                <a:latin typeface="Calibri"/>
+                <a:ea typeface="Microsoft YaHei" pitchFamily="2"/>
+                <a:cs typeface="Arial"/>
+              </a:defRPr>
+            </a:defPPr>
+            <a:lvl1pPr marL="432000" lvl="0" indent="-324000" algn="l" rtl="0">
+              <a:lnSpc>
+                <a:spcPct val="100000"/>
+              </a:lnSpc>
+              <a:spcBef>
+                <a:spcPts val="0"/>
+              </a:spcBef>
+              <a:spcAft>
+                <a:spcPts val="1417"/>
+              </a:spcAft>
+              <a:buSzPct val="45000"/>
+              <a:buFont typeface="StarSymbol"/>
+              <a:buChar char="●"/>
+              <a:defRPr lang="en-US" sz="3200" b="0" i="0" u="none" strike="noStrike" kern="1200" cap="none" spc="0">
+                <a:ln>
+                  <a:noFill/>
+                </a:ln>
+                <a:solidFill>
+                  <a:srgbClr val="000000"/>
+                </a:solidFill>
+                <a:latin typeface="Calibri"/>
+                <a:ea typeface="Microsoft YaHei" pitchFamily="2"/>
+                <a:cs typeface="Arial"/>
+              </a:defRPr>
+            </a:lvl1pPr>
+            <a:lvl2pPr marL="864000" lvl="1" indent="-324000" algn="l" rtl="0">
+              <a:lnSpc>
+                <a:spcPct val="100000"/>
+              </a:lnSpc>
+              <a:spcBef>
+                <a:spcPts val="0"/>
+              </a:spcBef>
+              <a:spcAft>
+                <a:spcPts val="1134"/>
+              </a:spcAft>
+              <a:buSzPct val="75000"/>
+              <a:buFont typeface="StarSymbol"/>
+              <a:buChar char="–"/>
+              <a:defRPr lang="en-US" sz="2400" b="0" i="0" u="none" strike="noStrike" kern="1200" cap="none" spc="0">
+                <a:ln>
+                  <a:noFill/>
+                </a:ln>
+                <a:solidFill>
+                  <a:srgbClr val="000000"/>
+                </a:solidFill>
+                <a:latin typeface="Calibri"/>
+                <a:ea typeface="Microsoft YaHei" pitchFamily="2"/>
+                <a:cs typeface="Arial"/>
+              </a:defRPr>
+            </a:lvl2pPr>
+            <a:lvl3pPr marL="1295999" lvl="2" indent="-288000" algn="l" rtl="0">
+              <a:lnSpc>
+                <a:spcPct val="100000"/>
+              </a:lnSpc>
+              <a:spcBef>
+                <a:spcPts val="0"/>
+              </a:spcBef>
+              <a:spcAft>
+                <a:spcPts val="850"/>
+              </a:spcAft>
+              <a:buSzPct val="45000"/>
+              <a:buFont typeface="StarSymbol"/>
+              <a:buChar char="●"/>
+              <a:defRPr lang="en-US" sz="2000" b="0" i="0" u="none" strike="noStrike" kern="1200" cap="none" spc="0">
+                <a:ln>
+                  <a:noFill/>
+                </a:ln>
+                <a:solidFill>
+                  <a:srgbClr val="000000"/>
+                </a:solidFill>
+                <a:latin typeface="Calibri"/>
+                <a:ea typeface="Microsoft YaHei" pitchFamily="2"/>
+                <a:cs typeface="Arial"/>
+              </a:defRPr>
+            </a:lvl3pPr>
+            <a:lvl4pPr marL="1728000" lvl="3" indent="-216000" algn="l" rtl="0">
+              <a:lnSpc>
+                <a:spcPct val="100000"/>
+              </a:lnSpc>
+              <a:spcBef>
+                <a:spcPts val="0"/>
+              </a:spcBef>
+              <a:spcAft>
+                <a:spcPts val="567"/>
+              </a:spcAft>
+              <a:buSzPct val="75000"/>
+              <a:buFont typeface="StarSymbol"/>
+              <a:buChar char="–"/>
+              <a:defRPr lang="en-US" sz="2000" b="0" i="0" u="none" strike="noStrike" kern="1200" cap="none" spc="0">
+                <a:ln>
+                  <a:noFill/>
+                </a:ln>
+                <a:solidFill>
+                  <a:srgbClr val="000000"/>
+                </a:solidFill>
+                <a:latin typeface="Calibri"/>
+                <a:ea typeface="Microsoft YaHei" pitchFamily="2"/>
+                <a:cs typeface="Arial"/>
+              </a:defRPr>
+            </a:lvl4pPr>
+            <a:lvl5pPr marL="2160000" lvl="4" indent="-216000" algn="l" rtl="0">
+              <a:lnSpc>
+                <a:spcPct val="100000"/>
+              </a:lnSpc>
+              <a:spcBef>
+                <a:spcPts val="0"/>
+              </a:spcBef>
+              <a:spcAft>
+                <a:spcPts val="283"/>
+              </a:spcAft>
+              <a:buSzPct val="45000"/>
+              <a:buFont typeface="StarSymbol"/>
+              <a:buChar char="●"/>
+              <a:defRPr lang="en-US" sz="2000" b="0" i="0" u="none" strike="noStrike" kern="1200" cap="none" spc="0">
+                <a:ln>
+                  <a:noFill/>
+                </a:ln>
+                <a:solidFill>
+                  <a:srgbClr val="000000"/>
+                </a:solidFill>
+                <a:latin typeface="Calibri"/>
+                <a:ea typeface="Microsoft YaHei" pitchFamily="2"/>
+                <a:cs typeface="Arial"/>
+              </a:defRPr>
+            </a:lvl5pPr>
+            <a:lvl6pPr marL="2592000" lvl="5" indent="-216000" algn="l" rtl="0">
+              <a:lnSpc>
+                <a:spcPct val="100000"/>
+              </a:lnSpc>
+              <a:spcBef>
+                <a:spcPts val="0"/>
+              </a:spcBef>
+              <a:spcAft>
+                <a:spcPts val="283"/>
+              </a:spcAft>
+              <a:buSzPct val="45000"/>
+              <a:buFont typeface="StarSymbol"/>
+              <a:buChar char="●"/>
+              <a:defRPr lang="en-US" sz="2000" b="0" i="0" u="none" strike="noStrike" kern="1200" cap="none" spc="0">
+                <a:ln>
+                  <a:noFill/>
+                </a:ln>
+                <a:solidFill>
+                  <a:srgbClr val="000000"/>
+                </a:solidFill>
+                <a:latin typeface="Calibri"/>
+                <a:ea typeface="Microsoft YaHei" pitchFamily="2"/>
+                <a:cs typeface="Arial"/>
+              </a:defRPr>
+            </a:lvl6pPr>
+            <a:lvl7pPr marL="3024000" lvl="6" indent="-216000" algn="l" rtl="0">
+              <a:lnSpc>
+                <a:spcPct val="100000"/>
+              </a:lnSpc>
+              <a:spcBef>
+                <a:spcPts val="0"/>
+              </a:spcBef>
+              <a:spcAft>
+                <a:spcPts val="283"/>
+              </a:spcAft>
+              <a:buSzPct val="45000"/>
+              <a:buFont typeface="StarSymbol"/>
+              <a:buChar char="●"/>
+              <a:defRPr lang="en-US" sz="2000" b="0" i="0" u="none" strike="noStrike" kern="1200" cap="none" spc="0">
+                <a:ln>
+                  <a:noFill/>
+                </a:ln>
+                <a:solidFill>
+                  <a:srgbClr val="000000"/>
+                </a:solidFill>
+                <a:latin typeface="Calibri"/>
+                <a:ea typeface="Microsoft YaHei" pitchFamily="2"/>
+                <a:cs typeface="Arial"/>
+              </a:defRPr>
+            </a:lvl7pPr>
+            <a:lvl8pPr marL="3456000" lvl="7" indent="-216000" algn="l" rtl="0">
+              <a:lnSpc>
+                <a:spcPct val="100000"/>
+              </a:lnSpc>
+              <a:spcBef>
+                <a:spcPts val="0"/>
+              </a:spcBef>
+              <a:spcAft>
+                <a:spcPts val="283"/>
+              </a:spcAft>
+              <a:buSzPct val="45000"/>
+              <a:buFont typeface="StarSymbol"/>
+              <a:buChar char="●"/>
+              <a:defRPr lang="en-US" sz="2000" b="0" i="0" u="none" strike="noStrike" kern="1200" cap="none" spc="0">
+                <a:ln>
+                  <a:noFill/>
+                </a:ln>
+                <a:solidFill>
+                  <a:srgbClr val="000000"/>
+                </a:solidFill>
+                <a:latin typeface="Calibri"/>
+                <a:ea typeface="Microsoft YaHei" pitchFamily="2"/>
+                <a:cs typeface="Arial"/>
+              </a:defRPr>
+            </a:lvl8pPr>
+            <a:lvl9pPr marL="3887999" lvl="8" indent="-216000" algn="l" rtl="0">
+              <a:lnSpc>
+                <a:spcPct val="100000"/>
+              </a:lnSpc>
+              <a:spcBef>
+                <a:spcPts val="0"/>
+              </a:spcBef>
+              <a:spcAft>
+                <a:spcPts val="283"/>
+              </a:spcAft>
+              <a:buSzPct val="45000"/>
+              <a:buFont typeface="StarSymbol"/>
+              <a:buChar char="●"/>
+              <a:defRPr lang="en-US" sz="2000" b="0" i="0" u="none" strike="noStrike" kern="1200" cap="none" spc="0">
+                <a:ln>
+                  <a:noFill/>
+                </a:ln>
+                <a:solidFill>
+                  <a:srgbClr val="000000"/>
+                </a:solidFill>
+                <a:latin typeface="Calibri"/>
+                <a:ea typeface="Microsoft YaHei" pitchFamily="2"/>
+                <a:cs typeface="Arial"/>
+              </a:defRPr>
+            </a:lvl9pPr>
+          </a:lstStyle>
+          <a:p>
+            <a:pPr marL="0" lvl="0" indent="0">
+              <a:spcBef>
+                <a:spcPts val="641"/>
+              </a:spcBef>
+              <a:spcAft>
+                <a:spcPts val="0"/>
+              </a:spcAft>
+              <a:buClr>
+                <a:srgbClr val="000000"/>
+              </a:buClr>
+              <a:buSzPct val="100000"/>
+              <a:buFont typeface="Arial" pitchFamily="32"/>
+              <a:buChar char="•"/>
+            </a:pPr>
+            <a:r>
+              <a:rPr lang="en-US" sz="2400" dirty="0"/>
+              <a:t>ROS Message ↔ </a:t>
+            </a:r>
+            <a:r>
+              <a:rPr lang="en-US" sz="2400" dirty="0" err="1"/>
+              <a:t>Machinekit</a:t>
+            </a:r>
+            <a:r>
+              <a:rPr lang="en-US" sz="2400" dirty="0"/>
+              <a:t> HAL</a:t>
+            </a:r>
+          </a:p>
+          <a:p>
+            <a:pPr marL="431999" lvl="2" indent="0"/>
+            <a:r>
+              <a:rPr lang="en-US" sz="2400" dirty="0"/>
+              <a:t>Directly connect signals (atomic values)</a:t>
+            </a:r>
+          </a:p>
+          <a:p>
+            <a:pPr marL="431999" lvl="2" indent="0"/>
+            <a:r>
+              <a:rPr lang="en-US" sz="2400" dirty="0"/>
+              <a:t>Ring and triple buffers for signal groups</a:t>
+            </a:r>
+          </a:p>
+          <a:p>
+            <a:pPr marL="431999" lvl="2" indent="0"/>
+            <a:r>
+              <a:rPr lang="en-US" sz="2400" dirty="0" err="1"/>
+              <a:t>Protobuf</a:t>
+            </a:r>
+            <a:r>
+              <a:rPr lang="en-US" sz="2400" dirty="0"/>
+              <a:t> messages</a:t>
+            </a:r>
+          </a:p>
+          <a:p>
+            <a:pPr marL="0" lvl="0" indent="0">
+              <a:spcBef>
+                <a:spcPts val="641"/>
+              </a:spcBef>
+              <a:spcAft>
+                <a:spcPts val="0"/>
+              </a:spcAft>
+              <a:buClr>
+                <a:srgbClr val="000000"/>
+              </a:buClr>
+              <a:buSzPct val="100000"/>
+              <a:buFont typeface="Arial" pitchFamily="32"/>
+              <a:buChar char="•"/>
+            </a:pPr>
+            <a:r>
+              <a:rPr lang="en-US" sz="2400" dirty="0"/>
+              <a:t>Where to tie into ROS?</a:t>
+            </a:r>
+          </a:p>
+          <a:p>
+            <a:pPr marL="431999" lvl="2" indent="0"/>
+            <a:r>
+              <a:rPr lang="en-US" sz="2400" dirty="0"/>
+              <a:t>Value updates are easy (both directions)</a:t>
+            </a:r>
+          </a:p>
+          <a:p>
+            <a:pPr marL="431999" lvl="2" indent="0"/>
+            <a:r>
+              <a:rPr lang="en-US" sz="2400" dirty="0"/>
+              <a:t>“Middleware” is more complicated:</a:t>
+            </a:r>
+          </a:p>
+          <a:p>
+            <a:pPr marL="864001" lvl="4" indent="0"/>
+            <a:r>
+              <a:rPr lang="en-US" sz="2400" dirty="0"/>
+              <a:t>Joint homing &amp; enforcing limits</a:t>
+            </a:r>
+          </a:p>
+          <a:p>
+            <a:pPr marL="864001" lvl="4" indent="0"/>
+            <a:r>
+              <a:rPr lang="en-US" sz="2400" dirty="0"/>
+              <a:t>Small time-scale path planning and closing servo loops</a:t>
+            </a:r>
+          </a:p>
+          <a:p>
+            <a:pPr marL="864001" lvl="4" indent="0"/>
+            <a:r>
+              <a:rPr lang="en-US" sz="2400" dirty="0"/>
+              <a:t>Can be in ROS or </a:t>
+            </a:r>
+            <a:r>
+              <a:rPr lang="en-US" sz="2400" dirty="0" err="1"/>
+              <a:t>Machinekit</a:t>
+            </a:r>
+            <a:r>
+              <a:rPr lang="en-US" sz="2400" dirty="0"/>
+              <a:t> or both</a:t>
+            </a:r>
+          </a:p>
+          <a:p>
+            <a:pPr marL="864001" lvl="4" indent="0"/>
+            <a:r>
+              <a:rPr lang="en-US" sz="2400" dirty="0"/>
+              <a:t>Reuse existing ROS code (</a:t>
+            </a:r>
+            <a:r>
+              <a:rPr lang="en-US" sz="2400" dirty="0" err="1"/>
+              <a:t>ros_control</a:t>
+            </a:r>
+            <a:r>
+              <a:rPr lang="en-US" sz="2400" dirty="0"/>
+              <a:t>?)</a:t>
+            </a:r>
+          </a:p>
+        </p:txBody>
+      </p:sp>
+    </p:spTree>
+  </p:cSld>
+  <p:clrMapOvr>
+    <a:masterClrMapping/>
+  </p:clrMapOvr>
+  <p:transition/>
+  <p:timing>
+    <p:tnLst>
+      <p:par>
+        <p:cTn id="1" dur="indefinite" restart="never" nodeType="tmRoot"/>
+      </p:par>
+    </p:tnLst>
+  </p:timing>
+</p:sld>
+</file>
+
+<file path=ppt/slides/slide14.xml><?xml version="1.0" encoding="utf-8"?>
+<p:sld xmlns:a="http://schemas.openxmlformats.org/drawingml/2006/main" xmlns:r="http://schemas.openxmlformats.org/officeDocument/2006/relationships" xmlns:p="http://schemas.openxmlformats.org/presentationml/2006/main">
+  <p:cSld>
+    <p:spTree>
+      <p:nvGrpSpPr>
+        <p:cNvPr id="1" name=""/>
+        <p:cNvGrpSpPr/>
+        <p:nvPr/>
+      </p:nvGrpSpPr>
+      <p:grpSpPr>
+        <a:xfrm>
+          <a:off x="0" y="0"/>
+          <a:ext cx="0" cy="0"/>
+          <a:chOff x="0" y="0"/>
+          <a:chExt cx="0" cy="0"/>
+        </a:xfrm>
+      </p:grpSpPr>
+      <p:sp>
+        <p:nvSpPr>
+          <p:cNvPr id="2" name="Title 1"/>
+          <p:cNvSpPr txBox="1">
+            <a:spLocks noGrp="1"/>
+          </p:cNvSpPr>
+          <p:nvPr>
+            <p:ph type="title" idx="4294967295"/>
+          </p:nvPr>
+        </p:nvSpPr>
+        <p:spPr>
+          <a:xfrm>
+            <a:off x="457200" y="304920"/>
+            <a:ext cx="8229240" cy="1142640"/>
+          </a:xfrm>
+        </p:spPr>
+        <p:txBody>
+          <a:bodyPr/>
+          <a:lstStyle>
+            <a:defPPr lvl="0">
+              <a:buSzPct val="45000"/>
+              <a:buFont typeface="StarSymbol"/>
+              <a:buNone/>
+            </a:defPPr>
+            <a:lvl1pPr lvl="0">
+              <a:buSzPct val="45000"/>
+              <a:buFont typeface="StarSymbol"/>
+              <a:buChar char="●"/>
+            </a:lvl1pPr>
+            <a:lvl2pPr lvl="1">
+              <a:buSzPct val="45000"/>
+              <a:buFont typeface="StarSymbol"/>
+              <a:buChar char="●"/>
+            </a:lvl2pPr>
+            <a:lvl3pPr lvl="2">
+              <a:buSzPct val="45000"/>
+              <a:buFont typeface="StarSymbol"/>
+              <a:buChar char="●"/>
+            </a:lvl3pPr>
+            <a:lvl4pPr lvl="3">
+              <a:buSzPct val="45000"/>
+              <a:buFont typeface="StarSymbol"/>
+              <a:buChar char="●"/>
+            </a:lvl4pPr>
+            <a:lvl5pPr lvl="4">
+              <a:buSzPct val="45000"/>
+              <a:buFont typeface="StarSymbol"/>
+              <a:buChar char="●"/>
+            </a:lvl5pPr>
+            <a:lvl6pPr lvl="5">
+              <a:buSzPct val="45000"/>
+              <a:buFont typeface="StarSymbol"/>
+              <a:buChar char="●"/>
+            </a:lvl6pPr>
+            <a:lvl7pPr lvl="6">
+              <a:buSzPct val="45000"/>
+              <a:buFont typeface="StarSymbol"/>
+              <a:buChar char="●"/>
+            </a:lvl7pPr>
+            <a:lvl8pPr lvl="7">
+              <a:buSzPct val="45000"/>
+              <a:buFont typeface="StarSymbol"/>
+              <a:buChar char="●"/>
+            </a:lvl8pPr>
+            <a:lvl9pPr lvl="8">
+              <a:buSzPct val="45000"/>
+              <a:buFont typeface="StarSymbol"/>
+              <a:buChar char="●"/>
+            </a:lvl9pPr>
+          </a:lstStyle>
+          <a:p>
+            <a:pPr lvl="0">
+              <a:buNone/>
+            </a:pPr>
+            <a:r>
+              <a:rPr lang="en-US"/>
+              <a:t>Example (Simple) Applications</a:t>
+            </a:r>
+          </a:p>
+        </p:txBody>
+      </p:sp>
+      <p:sp>
+        <p:nvSpPr>
+          <p:cNvPr id="3" name="Content Placeholder 2"/>
+          <p:cNvSpPr txBox="1">
+            <a:spLocks noGrp="1"/>
+          </p:cNvSpPr>
+          <p:nvPr>
+            <p:ph type="body" idx="4294967295"/>
+          </p:nvPr>
+        </p:nvSpPr>
+        <p:spPr>
+          <a:xfrm>
+            <a:off x="457200" y="1645920"/>
+            <a:ext cx="8229240" cy="5105160"/>
+          </a:xfrm>
+        </p:spPr>
+        <p:txBody>
+          <a:bodyPr/>
+          <a:lstStyle>
+            <a:defPPr marL="432000" lvl="0" indent="-324000" algn="l" rtl="0">
+              <a:lnSpc>
+                <a:spcPct val="100000"/>
+              </a:lnSpc>
+              <a:spcBef>
+                <a:spcPts val="0"/>
+              </a:spcBef>
+              <a:spcAft>
+                <a:spcPts val="1417"/>
+              </a:spcAft>
+              <a:buSzPct val="45000"/>
+              <a:buFont typeface="StarSymbol"/>
+              <a:buNone/>
+              <a:defRPr lang="en-US" sz="3200" b="0" i="0" u="none" strike="noStrike" kern="1200" cap="none" spc="0">
+                <a:ln>
+                  <a:noFill/>
+                </a:ln>
+                <a:solidFill>
+                  <a:srgbClr val="000000"/>
+                </a:solidFill>
+                <a:latin typeface="Calibri"/>
+                <a:ea typeface="Microsoft YaHei" pitchFamily="2"/>
+                <a:cs typeface="Arial"/>
+              </a:defRPr>
+            </a:defPPr>
+            <a:lvl1pPr marL="432000" lvl="0" indent="-324000" algn="l" rtl="0">
+              <a:lnSpc>
+                <a:spcPct val="100000"/>
+              </a:lnSpc>
+              <a:spcBef>
+                <a:spcPts val="0"/>
+              </a:spcBef>
+              <a:spcAft>
+                <a:spcPts val="1417"/>
+              </a:spcAft>
+              <a:buSzPct val="45000"/>
+              <a:buFont typeface="StarSymbol"/>
+              <a:buChar char="●"/>
+              <a:defRPr lang="en-US" sz="3200" b="0" i="0" u="none" strike="noStrike" kern="1200" cap="none" spc="0">
+                <a:ln>
+                  <a:noFill/>
+                </a:ln>
+                <a:solidFill>
+                  <a:srgbClr val="000000"/>
+                </a:solidFill>
+                <a:latin typeface="Calibri"/>
+                <a:ea typeface="Microsoft YaHei" pitchFamily="2"/>
+                <a:cs typeface="Arial"/>
+              </a:defRPr>
+            </a:lvl1pPr>
+            <a:lvl2pPr marL="864000" lvl="1" indent="-324000" algn="l" rtl="0">
+              <a:lnSpc>
+                <a:spcPct val="100000"/>
+              </a:lnSpc>
+              <a:spcBef>
+                <a:spcPts val="0"/>
+              </a:spcBef>
+              <a:spcAft>
+                <a:spcPts val="1134"/>
+              </a:spcAft>
+              <a:buSzPct val="75000"/>
+              <a:buFont typeface="StarSymbol"/>
+              <a:buChar char="–"/>
+              <a:defRPr lang="en-US" sz="2400" b="0" i="0" u="none" strike="noStrike" kern="1200" cap="none" spc="0">
+                <a:ln>
+                  <a:noFill/>
+                </a:ln>
+                <a:solidFill>
+                  <a:srgbClr val="000000"/>
+                </a:solidFill>
+                <a:latin typeface="Calibri"/>
+                <a:ea typeface="Microsoft YaHei" pitchFamily="2"/>
+                <a:cs typeface="Arial"/>
+              </a:defRPr>
+            </a:lvl2pPr>
+            <a:lvl3pPr marL="1295999" lvl="2" indent="-288000" algn="l" rtl="0">
+              <a:lnSpc>
+                <a:spcPct val="100000"/>
+              </a:lnSpc>
+              <a:spcBef>
+                <a:spcPts val="0"/>
+              </a:spcBef>
+              <a:spcAft>
+                <a:spcPts val="850"/>
+              </a:spcAft>
+              <a:buSzPct val="45000"/>
+              <a:buFont typeface="StarSymbol"/>
+              <a:buChar char="●"/>
+              <a:defRPr lang="en-US" sz="2000" b="0" i="0" u="none" strike="noStrike" kern="1200" cap="none" spc="0">
+                <a:ln>
+                  <a:noFill/>
+                </a:ln>
+                <a:solidFill>
+                  <a:srgbClr val="000000"/>
+                </a:solidFill>
+                <a:latin typeface="Calibri"/>
+                <a:ea typeface="Microsoft YaHei" pitchFamily="2"/>
+                <a:cs typeface="Arial"/>
+              </a:defRPr>
+            </a:lvl3pPr>
+            <a:lvl4pPr marL="1728000" lvl="3" indent="-216000" algn="l" rtl="0">
+              <a:lnSpc>
+                <a:spcPct val="100000"/>
+              </a:lnSpc>
+              <a:spcBef>
+                <a:spcPts val="0"/>
+              </a:spcBef>
+              <a:spcAft>
+                <a:spcPts val="567"/>
+              </a:spcAft>
+              <a:buSzPct val="75000"/>
+              <a:buFont typeface="StarSymbol"/>
+              <a:buChar char="–"/>
+              <a:defRPr lang="en-US" sz="2000" b="0" i="0" u="none" strike="noStrike" kern="1200" cap="none" spc="0">
+                <a:ln>
+                  <a:noFill/>
+                </a:ln>
+                <a:solidFill>
+                  <a:srgbClr val="000000"/>
+                </a:solidFill>
+                <a:latin typeface="Calibri"/>
+                <a:ea typeface="Microsoft YaHei" pitchFamily="2"/>
+                <a:cs typeface="Arial"/>
+              </a:defRPr>
+            </a:lvl4pPr>
+            <a:lvl5pPr marL="2160000" lvl="4" indent="-216000" algn="l" rtl="0">
+              <a:lnSpc>
+                <a:spcPct val="100000"/>
+              </a:lnSpc>
+              <a:spcBef>
+                <a:spcPts val="0"/>
+              </a:spcBef>
+              <a:spcAft>
+                <a:spcPts val="283"/>
+              </a:spcAft>
+              <a:buSzPct val="45000"/>
+              <a:buFont typeface="StarSymbol"/>
+              <a:buChar char="●"/>
+              <a:defRPr lang="en-US" sz="2000" b="0" i="0" u="none" strike="noStrike" kern="1200" cap="none" spc="0">
+                <a:ln>
+                  <a:noFill/>
+                </a:ln>
+                <a:solidFill>
+                  <a:srgbClr val="000000"/>
+                </a:solidFill>
+                <a:latin typeface="Calibri"/>
+                <a:ea typeface="Microsoft YaHei" pitchFamily="2"/>
+                <a:cs typeface="Arial"/>
+              </a:defRPr>
+            </a:lvl5pPr>
+            <a:lvl6pPr marL="2592000" lvl="5" indent="-216000" algn="l" rtl="0">
+              <a:lnSpc>
+                <a:spcPct val="100000"/>
+              </a:lnSpc>
+              <a:spcBef>
+                <a:spcPts val="0"/>
+              </a:spcBef>
+              <a:spcAft>
+                <a:spcPts val="283"/>
+              </a:spcAft>
+              <a:buSzPct val="45000"/>
+              <a:buFont typeface="StarSymbol"/>
+              <a:buChar char="●"/>
+              <a:defRPr lang="en-US" sz="2000" b="0" i="0" u="none" strike="noStrike" kern="1200" cap="none" spc="0">
+                <a:ln>
+                  <a:noFill/>
+                </a:ln>
+                <a:solidFill>
+                  <a:srgbClr val="000000"/>
+                </a:solidFill>
+                <a:latin typeface="Calibri"/>
+                <a:ea typeface="Microsoft YaHei" pitchFamily="2"/>
+                <a:cs typeface="Arial"/>
+              </a:defRPr>
+            </a:lvl6pPr>
+            <a:lvl7pPr marL="3024000" lvl="6" indent="-216000" algn="l" rtl="0">
+              <a:lnSpc>
+                <a:spcPct val="100000"/>
+              </a:lnSpc>
+              <a:spcBef>
+                <a:spcPts val="0"/>
+              </a:spcBef>
+              <a:spcAft>
+                <a:spcPts val="283"/>
+              </a:spcAft>
+              <a:buSzPct val="45000"/>
+              <a:buFont typeface="StarSymbol"/>
+              <a:buChar char="●"/>
+              <a:defRPr lang="en-US" sz="2000" b="0" i="0" u="none" strike="noStrike" kern="1200" cap="none" spc="0">
+                <a:ln>
+                  <a:noFill/>
+                </a:ln>
+                <a:solidFill>
+                  <a:srgbClr val="000000"/>
+                </a:solidFill>
+                <a:latin typeface="Calibri"/>
+                <a:ea typeface="Microsoft YaHei" pitchFamily="2"/>
+                <a:cs typeface="Arial"/>
+              </a:defRPr>
+            </a:lvl7pPr>
+            <a:lvl8pPr marL="3456000" lvl="7" indent="-216000" algn="l" rtl="0">
+              <a:lnSpc>
+                <a:spcPct val="100000"/>
+              </a:lnSpc>
+              <a:spcBef>
+                <a:spcPts val="0"/>
+              </a:spcBef>
+              <a:spcAft>
+                <a:spcPts val="283"/>
+              </a:spcAft>
+              <a:buSzPct val="45000"/>
+              <a:buFont typeface="StarSymbol"/>
+              <a:buChar char="●"/>
+              <a:defRPr lang="en-US" sz="2000" b="0" i="0" u="none" strike="noStrike" kern="1200" cap="none" spc="0">
+                <a:ln>
+                  <a:noFill/>
+                </a:ln>
+                <a:solidFill>
+                  <a:srgbClr val="000000"/>
+                </a:solidFill>
+                <a:latin typeface="Calibri"/>
+                <a:ea typeface="Microsoft YaHei" pitchFamily="2"/>
+                <a:cs typeface="Arial"/>
+              </a:defRPr>
+            </a:lvl8pPr>
+            <a:lvl9pPr marL="3887999" lvl="8" indent="-216000" algn="l" rtl="0">
+              <a:lnSpc>
+                <a:spcPct val="100000"/>
+              </a:lnSpc>
+              <a:spcBef>
+                <a:spcPts val="0"/>
+              </a:spcBef>
+              <a:spcAft>
+                <a:spcPts val="283"/>
+              </a:spcAft>
+              <a:buSzPct val="45000"/>
+              <a:buFont typeface="StarSymbol"/>
+              <a:buChar char="●"/>
+              <a:defRPr lang="en-US" sz="2000" b="0" i="0" u="none" strike="noStrike" kern="1200" cap="none" spc="0">
+                <a:ln>
+                  <a:noFill/>
+                </a:ln>
+                <a:solidFill>
+                  <a:srgbClr val="000000"/>
+                </a:solidFill>
+                <a:latin typeface="Calibri"/>
+                <a:ea typeface="Microsoft YaHei" pitchFamily="2"/>
+                <a:cs typeface="Arial"/>
+              </a:defRPr>
+            </a:lvl9pPr>
+          </a:lstStyle>
+          <a:p>
+            <a:pPr marL="0" lvl="0" indent="0">
+              <a:buClr>
+                <a:srgbClr val="000000"/>
+              </a:buClr>
+              <a:buSzPct val="100000"/>
+              <a:buFont typeface="Arial" pitchFamily="32"/>
+              <a:buChar char="•"/>
+            </a:pPr>
+            <a:r>
+              <a:rPr lang="en-US" sz="2800"/>
+              <a:t>Physical stepper tracking JointTrajectory messages from ROS:</a:t>
+            </a:r>
+          </a:p>
+          <a:p>
+            <a:pPr marL="0" lvl="0" indent="0">
+              <a:buNone/>
+            </a:pPr>
+            <a:r>
+              <a:rPr lang="en-US" sz="2800">
+                <a:hlinkClick r:id="rId3"/>
+              </a:rPr>
+              <a:t>https://youtu.be/b4O2KU2bLWE</a:t>
+            </a:r>
+          </a:p>
+          <a:p>
+            <a:pPr marL="0" lvl="0" indent="0">
+              <a:buNone/>
+            </a:pPr>
+            <a:endParaRPr lang="en-US" sz="2800"/>
+          </a:p>
+          <a:p>
+            <a:pPr marL="0" lvl="0" indent="0">
+              <a:spcBef>
+                <a:spcPts val="641"/>
+              </a:spcBef>
+              <a:spcAft>
+                <a:spcPts val="0"/>
+              </a:spcAft>
+              <a:buClr>
+                <a:srgbClr val="000000"/>
+              </a:buClr>
+              <a:buSzPct val="100000"/>
+              <a:buFont typeface="Arial" pitchFamily="32"/>
+              <a:buChar char="•"/>
+            </a:pPr>
+            <a:r>
+              <a:rPr lang="en-US" sz="2800"/>
+              <a:t>Three stepper motors tracking 3D mouse:</a:t>
+            </a:r>
+          </a:p>
+          <a:p>
+            <a:pPr marL="0" lvl="0" indent="0">
+              <a:spcBef>
+                <a:spcPts val="641"/>
+              </a:spcBef>
+              <a:spcAft>
+                <a:spcPts val="0"/>
+              </a:spcAft>
+              <a:buNone/>
+            </a:pPr>
+            <a:r>
+              <a:rPr lang="en-US" sz="2800">
+                <a:hlinkClick r:id="rId4"/>
+              </a:rPr>
+              <a:t>https://youtu.be/m0OeaTcWTZA</a:t>
+            </a:r>
+          </a:p>
+          <a:p>
+            <a:pPr marL="0" lvl="0" indent="0">
+              <a:spcBef>
+                <a:spcPts val="641"/>
+              </a:spcBef>
+              <a:spcAft>
+                <a:spcPts val="0"/>
+              </a:spcAft>
+              <a:buNone/>
+            </a:pPr>
+            <a:endParaRPr lang="en-US" sz="2800"/>
+          </a:p>
+          <a:p>
+            <a:pPr marL="0" lvl="0" indent="0">
+              <a:spcBef>
+                <a:spcPts val="641"/>
+              </a:spcBef>
+              <a:spcAft>
+                <a:spcPts val="0"/>
+              </a:spcAft>
+              <a:buClr>
+                <a:srgbClr val="000000"/>
+              </a:buClr>
+              <a:buSzPct val="100000"/>
+              <a:buFont typeface="Arial" pitchFamily="32"/>
+              <a:buChar char="•"/>
+            </a:pPr>
+            <a:r>
+              <a:rPr lang="en-US" sz="2800"/>
+              <a:t>Machinekit HAL values → ROS Message:</a:t>
+            </a:r>
+          </a:p>
+          <a:p>
+            <a:pPr marL="0" lvl="0" indent="0">
+              <a:spcBef>
+                <a:spcPts val="641"/>
+              </a:spcBef>
+              <a:spcAft>
+                <a:spcPts val="0"/>
+              </a:spcAft>
+              <a:buNone/>
+            </a:pPr>
+            <a:r>
+              <a:rPr lang="en-US" sz="2800">
+                <a:hlinkClick r:id="rId5"/>
+              </a:rPr>
+              <a:t>https://github.com/mhaberler/ros_hello_machinekit</a:t>
+            </a:r>
+          </a:p>
+        </p:txBody>
+      </p:sp>
+    </p:spTree>
+  </p:cSld>
+  <p:clrMapOvr>
+    <a:masterClrMapping/>
+  </p:clrMapOvr>
+  <p:transition/>
+  <p:timing>
+    <p:tnLst>
+      <p:par>
+        <p:cTn id="1" dur="indefinite" restart="never" nodeType="tmRoot"/>
+      </p:par>
+    </p:tnLst>
+  </p:timing>
+</p:sld>
+</file>
+
+<file path=ppt/slides/slide15.xml><?xml version="1.0" encoding="utf-8"?>
+<p:sld xmlns:a="http://schemas.openxmlformats.org/drawingml/2006/main" xmlns:r="http://schemas.openxmlformats.org/officeDocument/2006/relationships" xmlns:p="http://schemas.openxmlformats.org/presentationml/2006/main">
+  <p:cSld>
+    <p:spTree>
+      <p:nvGrpSpPr>
+        <p:cNvPr id="1" name=""/>
+        <p:cNvGrpSpPr/>
+        <p:nvPr/>
+      </p:nvGrpSpPr>
+      <p:grpSpPr>
+        <a:xfrm>
+          <a:off x="0" y="0"/>
+          <a:ext cx="0" cy="0"/>
+          <a:chOff x="0" y="0"/>
+          <a:chExt cx="0" cy="0"/>
+        </a:xfrm>
+      </p:grpSpPr>
+      <p:sp>
+        <p:nvSpPr>
+          <p:cNvPr id="21505" name="Title 1"/>
+          <p:cNvSpPr>
+            <a:spLocks noGrp="1"/>
+          </p:cNvSpPr>
+          <p:nvPr>
+            <p:ph type="title"/>
+          </p:nvPr>
+        </p:nvSpPr>
+        <p:spPr/>
+        <p:txBody>
+          <a:bodyPr/>
+          <a:lstStyle/>
+          <a:p>
+            <a:r>
+              <a:rPr lang="en-US" altLang="nl-NL" smtClean="0"/>
+              <a:t>Announcements</a:t>
+            </a:r>
+          </a:p>
+        </p:txBody>
+      </p:sp>
+      <p:sp>
+        <p:nvSpPr>
+          <p:cNvPr id="21506" name="Content Placeholder 2"/>
+          <p:cNvSpPr>
+            <a:spLocks noGrp="1"/>
+          </p:cNvSpPr>
+          <p:nvPr>
+            <p:ph idx="1"/>
+          </p:nvPr>
+        </p:nvSpPr>
+        <p:spPr/>
+        <p:txBody>
+          <a:bodyPr/>
+          <a:lstStyle/>
+          <a:p>
+            <a:r>
+              <a:rPr lang="en-US" altLang="nl-NL" dirty="0" smtClean="0"/>
+              <a:t>High-DOF Planning for Assembly –NIST Cooperative </a:t>
+            </a:r>
+            <a:r>
+              <a:rPr lang="en-US" altLang="nl-NL" dirty="0" smtClean="0"/>
+              <a:t>Agreement</a:t>
+            </a:r>
+            <a:endParaRPr lang="en-US" altLang="nl-NL" dirty="0" smtClean="0"/>
+          </a:p>
+          <a:p>
+            <a:pPr lvl="1"/>
+            <a:r>
+              <a:rPr lang="en-US" altLang="nl-NL" dirty="0" smtClean="0"/>
+              <a:t>Descartes/MoveIt improvements/extensions</a:t>
+            </a:r>
+          </a:p>
+          <a:p>
+            <a:r>
+              <a:rPr lang="en-US" altLang="nl-NL" dirty="0" smtClean="0"/>
+              <a:t>Asus </a:t>
+            </a:r>
+            <a:r>
+              <a:rPr lang="en-US" altLang="nl-NL" dirty="0" err="1" smtClean="0"/>
+              <a:t>Xtion</a:t>
+            </a:r>
+            <a:r>
+              <a:rPr lang="en-US" altLang="nl-NL" dirty="0" smtClean="0"/>
+              <a:t> Pro Live availability - </a:t>
+            </a:r>
+            <a:r>
+              <a:rPr lang="en-US" altLang="nl-NL" dirty="0" smtClean="0">
+                <a:hlinkClick r:id="rId2"/>
+              </a:rPr>
+              <a:t>http://www.newegg.com/Product/Product.aspx?Item=N82E16826785030</a:t>
+            </a:r>
+            <a:r>
+              <a:rPr lang="en-US" altLang="nl-NL" dirty="0" smtClean="0"/>
+              <a:t> </a:t>
+            </a:r>
+          </a:p>
+          <a:p>
+            <a:pPr marL="0" indent="0">
+              <a:buNone/>
+            </a:pPr>
+            <a:endParaRPr lang="en-US" altLang="nl-NL" dirty="0" smtClean="0"/>
+          </a:p>
+        </p:txBody>
+      </p:sp>
+    </p:spTree>
+  </p:cSld>
+  <p:clrMapOvr>
+    <a:masterClrMapping/>
+  </p:clrMapOvr>
+</p:sld>
+</file>
+
+<file path=ppt/slides/slide16.xml><?xml version="1.0" encoding="utf-8"?>
+<p:sld xmlns:a="http://schemas.openxmlformats.org/drawingml/2006/main" xmlns:r="http://schemas.openxmlformats.org/officeDocument/2006/relationships" xmlns:p="http://schemas.openxmlformats.org/presentationml/2006/main">
+  <p:cSld>
+    <p:spTree>
+      <p:nvGrpSpPr>
+        <p:cNvPr id="1" name=""/>
+        <p:cNvGrpSpPr/>
+        <p:nvPr/>
+      </p:nvGrpSpPr>
+      <p:grpSpPr>
+        <a:xfrm>
+          <a:off x="0" y="0"/>
+          <a:ext cx="0" cy="0"/>
+          <a:chOff x="0" y="0"/>
+          <a:chExt cx="0" cy="0"/>
+        </a:xfrm>
+      </p:grpSpPr>
+      <p:sp>
+        <p:nvSpPr>
+          <p:cNvPr id="22529" name="Title 1"/>
+          <p:cNvSpPr>
+            <a:spLocks noGrp="1"/>
+          </p:cNvSpPr>
+          <p:nvPr>
+            <p:ph type="title"/>
+          </p:nvPr>
+        </p:nvSpPr>
+        <p:spPr/>
+        <p:txBody>
+          <a:bodyPr/>
+          <a:lstStyle/>
+          <a:p>
+            <a:r>
+              <a:rPr lang="en-US" altLang="nl-NL" dirty="0" smtClean="0"/>
+              <a:t>Action Items</a:t>
+            </a:r>
+          </a:p>
+        </p:txBody>
+      </p:sp>
+      <p:sp>
+        <p:nvSpPr>
+          <p:cNvPr id="22530" name="Content Placeholder 2"/>
+          <p:cNvSpPr>
+            <a:spLocks noGrp="1"/>
+          </p:cNvSpPr>
+          <p:nvPr>
+            <p:ph idx="1"/>
+          </p:nvPr>
+        </p:nvSpPr>
+        <p:spPr/>
+        <p:txBody>
+          <a:bodyPr/>
+          <a:lstStyle/>
+          <a:p>
+            <a:pPr marL="0" indent="0"/>
+            <a:r>
+              <a:rPr lang="en-US" altLang="nl-NL" dirty="0" smtClean="0"/>
+              <a:t> Incorporate Travis CI – It’s so </a:t>
+            </a:r>
+            <a:r>
+              <a:rPr lang="en-US" altLang="nl-NL" dirty="0" smtClean="0"/>
+              <a:t>easy - </a:t>
+            </a:r>
+            <a:r>
+              <a:rPr lang="en-US" altLang="nl-NL" dirty="0" smtClean="0">
+                <a:hlinkClick r:id="rId2"/>
+              </a:rPr>
+              <a:t>https://</a:t>
+            </a:r>
+            <a:r>
+              <a:rPr lang="en-US" altLang="nl-NL" dirty="0" smtClean="0">
+                <a:hlinkClick r:id="rId2"/>
+              </a:rPr>
+              <a:t>github.com/ros-industrial/industrial_ci/blob/master/README.rst</a:t>
+            </a:r>
+            <a:r>
+              <a:rPr lang="en-US" altLang="nl-NL" dirty="0" smtClean="0"/>
+              <a:t> </a:t>
+            </a:r>
+            <a:endParaRPr lang="en-US" altLang="nl-NL" dirty="0" smtClean="0"/>
+          </a:p>
+          <a:p>
+            <a:pPr marL="0" indent="0"/>
+            <a:r>
+              <a:rPr lang="en-US" altLang="nl-NL" dirty="0" smtClean="0"/>
+              <a:t> Close/address Issues/PRs</a:t>
+            </a:r>
           </a:p>
         </p:txBody>
       </p:sp>
@@ -3845,10 +6512,36 @@
               <a:defRPr/>
             </a:pPr>
             <a:r>
+              <a:rPr lang="en-US" dirty="0" err="1" smtClean="0"/>
+              <a:t>QTCreator</a:t>
+            </a:r>
+            <a:r>
               <a:rPr lang="en-US" dirty="0" smtClean="0"/>
-              <a:t>TBD</a:t>
+              <a:t> ROS </a:t>
+            </a:r>
+            <a:r>
+              <a:rPr lang="en-US" dirty="0" err="1" smtClean="0"/>
+              <a:t>Plugin</a:t>
             </a:r>
             <a:endParaRPr lang="en-US" dirty="0" smtClean="0"/>
+          </a:p>
+          <a:p>
+            <a:pPr lvl="1" fontAlgn="auto">
+              <a:spcAft>
+                <a:spcPts val="0"/>
+              </a:spcAft>
+              <a:buFont typeface="Arial" pitchFamily="34" charset="0"/>
+              <a:buChar char="–"/>
+              <a:defRPr/>
+            </a:pPr>
+            <a:r>
+              <a:rPr lang="en-US" dirty="0" err="1" smtClean="0"/>
+              <a:t>MachineKit</a:t>
+            </a:r>
+            <a:r>
+              <a:rPr lang="en-US" dirty="0" smtClean="0"/>
+              <a:t> Integration</a:t>
+            </a:r>
           </a:p>
           <a:p>
             <a:pPr fontAlgn="auto">
@@ -4018,7 +6711,7 @@
         </p:nvSpPr>
         <p:spPr>
           <a:xfrm>
-            <a:off x="457200" y="1600200"/>
+            <a:off x="457200" y="1371600"/>
             <a:ext cx="8229600" cy="5105400"/>
           </a:xfrm>
         </p:spPr>
@@ -4027,47 +6720,94 @@
           <a:lstStyle/>
           <a:p>
             <a:r>
-              <a:rPr lang="en-US" altLang="nl-NL" dirty="0" smtClean="0"/>
+              <a:rPr lang="en-US" altLang="nl-NL" sz="2800" dirty="0" smtClean="0"/>
               <a:t>Current Development</a:t>
             </a:r>
           </a:p>
           <a:p>
             <a:pPr lvl="1"/>
             <a:r>
+              <a:rPr lang="en-US" altLang="nl-NL" sz="2000" dirty="0" smtClean="0"/>
+              <a:t>New repos</a:t>
+            </a:r>
+          </a:p>
+          <a:p>
+            <a:pPr lvl="2"/>
+            <a:r>
+              <a:rPr lang="en-US" altLang="nl-NL" sz="1800" dirty="0" err="1" smtClean="0"/>
+              <a:t>staubli_experimental</a:t>
+            </a:r>
+            <a:endParaRPr lang="en-US" altLang="nl-NL" sz="1800" dirty="0" smtClean="0"/>
+          </a:p>
+          <a:p>
+            <a:pPr lvl="2"/>
+            <a:r>
+              <a:rPr lang="en-US" altLang="nl-NL" sz="1800" dirty="0" err="1" smtClean="0"/>
+              <a:t>godel</a:t>
+            </a:r>
+            <a:endParaRPr lang="en-US" altLang="nl-NL" sz="2000" dirty="0" smtClean="0"/>
+          </a:p>
+          <a:p>
+            <a:r>
+              <a:rPr lang="en-US" altLang="nl-NL" sz="2800" dirty="0" smtClean="0"/>
+              <a:t>Upcoming Development</a:t>
+            </a:r>
+          </a:p>
+          <a:p>
+            <a:pPr lvl="1"/>
+            <a:r>
+              <a:rPr lang="en-US" altLang="nl-NL" sz="2000" dirty="0" smtClean="0"/>
+              <a:t>CRCL</a:t>
+            </a:r>
+          </a:p>
+          <a:p>
+            <a:pPr lvl="2"/>
+            <a:r>
+              <a:rPr lang="en-US" altLang="nl-NL" sz="1800" dirty="0" smtClean="0"/>
+              <a:t>MTConnect-CRCL bridge</a:t>
+            </a:r>
+          </a:p>
+          <a:p>
+            <a:pPr lvl="1"/>
+            <a:r>
+              <a:rPr lang="en-US" altLang="nl-NL" sz="2200" dirty="0" smtClean="0"/>
+              <a:t>Industrial core</a:t>
+            </a:r>
+          </a:p>
+          <a:p>
+            <a:pPr lvl="2"/>
+            <a:r>
+              <a:rPr lang="en-US" altLang="nl-NL" sz="1800" dirty="0" smtClean="0"/>
+              <a:t>Partial support for multiple motion groups</a:t>
+            </a:r>
+          </a:p>
+          <a:p>
+            <a:r>
+              <a:rPr lang="en-US" altLang="nl-NL" sz="2800" dirty="0" smtClean="0"/>
+              <a:t>Open Issues</a:t>
+            </a:r>
+          </a:p>
+          <a:p>
+            <a:pPr lvl="1"/>
+            <a:r>
+              <a:rPr lang="en-US" altLang="nl-NL" sz="2400" dirty="0" err="1" smtClean="0"/>
+              <a:t>Canopen</a:t>
+            </a:r>
+            <a:r>
               <a:rPr lang="en-US" altLang="nl-NL" sz="2400" dirty="0" smtClean="0"/>
-              <a:t>TBD</a:t>
-            </a:r>
-            <a:endParaRPr lang="en-US" altLang="nl-NL" sz="2400" dirty="0" smtClean="0"/>
-          </a:p>
-          <a:p>
-            <a:pPr marL="457200" lvl="1" indent="0">
-              <a:buNone/>
-            </a:pPr>
-            <a:endParaRPr lang="en-US" altLang="nl-NL" sz="2400" dirty="0" smtClean="0"/>
-          </a:p>
-          <a:p>
-            <a:r>
-              <a:rPr lang="en-US" altLang="nl-NL" dirty="0" smtClean="0"/>
-              <a:t>Upcoming Development</a:t>
+              <a:t> license status</a:t>
             </a:r>
           </a:p>
           <a:p>
             <a:pPr lvl="1"/>
             <a:r>
               <a:rPr lang="en-US" altLang="nl-NL" sz="2400" dirty="0" smtClean="0"/>
-              <a:t>TBD</a:t>
-            </a:r>
-            <a:endParaRPr lang="en-US" altLang="nl-NL" sz="2400" dirty="0" smtClean="0"/>
-          </a:p>
-          <a:p>
-            <a:pPr marL="457200" lvl="1" indent="0">
-              <a:buNone/>
-            </a:pPr>
-            <a:endParaRPr lang="en-US" altLang="nl-NL" sz="2400" dirty="0" smtClean="0"/>
-          </a:p>
-          <a:p>
-            <a:r>
-              <a:rPr lang="en-US" altLang="nl-NL" dirty="0" smtClean="0"/>
+              <a:t>UR C++ driver</a:t>
+            </a:r>
+          </a:p>
+          <a:p>
+            <a:r>
+              <a:rPr lang="en-US" altLang="nl-NL" sz="2800" dirty="0" smtClean="0"/>
               <a:t>See meeting notes for details</a:t>
             </a:r>
           </a:p>
@@ -4137,9 +6877,39 @@
           <a:p>
             <a:r>
               <a:rPr lang="en-US" altLang="nl-NL" dirty="0" smtClean="0"/>
-              <a:t>TBD</a:t>
-            </a:r>
-            <a:endParaRPr lang="en-US" altLang="nl-NL" dirty="0" smtClean="0"/>
+              <a:t>Follow up with Canonical, inform them of the ROS-I discussion</a:t>
+            </a:r>
+          </a:p>
+          <a:p>
+            <a:pPr lvl="1"/>
+            <a:r>
+              <a:rPr lang="en-US" altLang="nl-NL" dirty="0" err="1" smtClean="0"/>
+              <a:t>Ragnar</a:t>
+            </a:r>
+            <a:r>
+              <a:rPr lang="en-US" altLang="nl-NL" dirty="0" smtClean="0"/>
+              <a:t> pick and place – Shaun</a:t>
+            </a:r>
+          </a:p>
+          <a:p>
+            <a:pPr lvl="1"/>
+            <a:r>
+              <a:rPr lang="en-US" altLang="nl-NL" dirty="0" smtClean="0"/>
+              <a:t>CAD to ROS – Gijs/Paul</a:t>
+            </a:r>
+          </a:p>
+          <a:p>
+            <a:pPr lvl="1"/>
+            <a:r>
+              <a:rPr lang="en-US" altLang="nl-NL" dirty="0" smtClean="0"/>
+              <a:t>ROS-I hardware platform – Mirko</a:t>
+            </a:r>
+          </a:p>
+          <a:p>
+            <a:r>
+              <a:rPr lang="en-US" altLang="nl-NL" dirty="0" smtClean="0"/>
+              <a:t>OPC UA Update</a:t>
+            </a:r>
           </a:p>
         </p:txBody>
       </p:sp>
@@ -4212,10 +6982,35 @@
               <a:buChar char="•"/>
             </a:pPr>
             <a:r>
+              <a:rPr lang="en-US" altLang="nl-NL" dirty="0" err="1" smtClean="0"/>
+              <a:t>QTCreator</a:t>
+            </a:r>
+            <a:r>
               <a:rPr lang="en-US" altLang="nl-NL" dirty="0" smtClean="0"/>
-              <a:t>TBD</a:t>
-            </a:r>
-            <a:endParaRPr lang="en-US" altLang="nl-NL" dirty="0" smtClean="0"/>
+              <a:t> ROS </a:t>
+            </a:r>
+            <a:r>
+              <a:rPr lang="en-US" altLang="nl-NL" dirty="0" err="1" smtClean="0"/>
+              <a:t>Plugin</a:t>
+            </a:r>
+            <a:r>
+              <a:rPr lang="en-US" altLang="nl-NL" dirty="0" smtClean="0"/>
+              <a:t> - Levi Armstrong</a:t>
+            </a:r>
+          </a:p>
+          <a:p>
+            <a:pPr marL="342900" lvl="1" indent="-342900">
+              <a:buFont typeface="Arial" charset="0"/>
+              <a:buChar char="•"/>
+            </a:pPr>
+            <a:r>
+              <a:rPr lang="en-US" altLang="nl-NL" dirty="0" err="1" smtClean="0"/>
+              <a:t>MachineKit</a:t>
+            </a:r>
+            <a:r>
+              <a:rPr lang="en-US" altLang="nl-NL" dirty="0" smtClean="0"/>
+              <a:t> Integration - Charles Steinkuehler</a:t>
+            </a:r>
           </a:p>
           <a:p>
             <a:pPr marL="0" lvl="1" indent="0">
@@ -4256,7 +7051,7 @@
       </p:grpSpPr>
       <p:sp>
         <p:nvSpPr>
-          <p:cNvPr id="21505" name="Title 1"/>
+          <p:cNvPr id="4" name="Title 3"/>
           <p:cNvSpPr>
             <a:spLocks noGrp="1"/>
           </p:cNvSpPr>
@@ -4270,20 +7065,25 @@
           <a:lstStyle/>
           <a:p>
             <a:r>
-              <a:rPr lang="en-US" altLang="nl-NL" smtClean="0"/>
-              <a:t>Announcements</a:t>
-            </a:r>
-          </a:p>
-        </p:txBody>
-      </p:sp>
-      <p:sp>
-        <p:nvSpPr>
-          <p:cNvPr id="21506" name="Content Placeholder 2"/>
-          <p:cNvSpPr>
-            <a:spLocks noGrp="1"/>
-          </p:cNvSpPr>
-          <p:nvPr>
-            <p:ph idx="1"/>
+              <a:rPr lang="en-US" dirty="0" smtClean="0"/>
+              <a:t>QT Creator ROS </a:t>
+            </a:r>
+            <a:r>
+              <a:rPr lang="en-US" dirty="0" err="1" smtClean="0"/>
+              <a:t>Plugin</a:t>
+            </a:r>
+            <a:endParaRPr lang="en-US" dirty="0"/>
+          </a:p>
+        </p:txBody>
+      </p:sp>
+      <p:sp>
+        <p:nvSpPr>
+          <p:cNvPr id="5" name="Text Placeholder 4"/>
+          <p:cNvSpPr>
+            <a:spLocks noGrp="1"/>
+          </p:cNvSpPr>
+          <p:nvPr>
+            <p:ph type="body" idx="1"/>
           </p:nvPr>
         </p:nvSpPr>
         <p:spPr/>
@@ -4292,16 +7092,10 @@
           <a:lstStyle/>
           <a:p>
             <a:r>
-              <a:rPr lang="en-US" altLang="nl-NL" dirty="0" smtClean="0"/>
-              <a:t>TBD</a:t>
-            </a:r>
-            <a:endParaRPr lang="en-US" altLang="nl-NL" dirty="0" smtClean="0"/>
-          </a:p>
-          <a:p>
-            <a:pPr marL="0" indent="0">
-              <a:buNone/>
-            </a:pPr>
-            <a:endParaRPr lang="en-US" altLang="nl-NL" dirty="0" smtClean="0"/>
+              <a:rPr lang="en-US" dirty="0" smtClean="0"/>
+              <a:t>Levi Armstrong</a:t>
+            </a:r>
+            <a:endParaRPr lang="en-US" dirty="0"/>
           </a:p>
         </p:txBody>
       </p:sp>
@@ -4332,7 +7126,7 @@
       </p:grpSpPr>
       <p:sp>
         <p:nvSpPr>
-          <p:cNvPr id="22529" name="Title 1"/>
+          <p:cNvPr id="14337" name="Title 1"/>
           <p:cNvSpPr>
             <a:spLocks noGrp="1"/>
           </p:cNvSpPr>
@@ -4347,19 +7141,439 @@
           <a:p>
             <a:r>
               <a:rPr lang="en-US" altLang="nl-NL" dirty="0" smtClean="0"/>
-              <a:t>Action Items</a:t>
-            </a:r>
-          </a:p>
-        </p:txBody>
-      </p:sp>
-      <p:sp>
-        <p:nvSpPr>
-          <p:cNvPr id="22530" name="Content Placeholder 2"/>
-          <p:cNvSpPr>
-            <a:spLocks noGrp="1"/>
-          </p:cNvSpPr>
-          <p:nvPr>
-            <p:ph idx="1"/>
+              <a:t>Customized IDE for ROS</a:t>
+            </a:r>
+          </a:p>
+        </p:txBody>
+      </p:sp>
+      <p:sp>
+        <p:nvSpPr>
+          <p:cNvPr id="3" name="Content Placeholder 2"/>
+          <p:cNvSpPr>
+            <a:spLocks noGrp="1"/>
+          </p:cNvSpPr>
+          <p:nvPr>
+            <p:ph sz="half" idx="1"/>
+          </p:nvPr>
+        </p:nvSpPr>
+        <p:spPr>
+          <a:xfrm>
+            <a:off x="457200" y="1600200"/>
+            <a:ext cx="4038600" cy="4724400"/>
+          </a:xfrm>
+        </p:spPr>
+        <p:txBody>
+          <a:bodyPr rtlCol="0">
+            <a:normAutofit fontScale="62500" lnSpcReduction="20000"/>
+          </a:bodyPr>
+          <a:lstStyle/>
+          <a:p>
+            <a:pPr fontAlgn="auto">
+              <a:spcAft>
+                <a:spcPts val="0"/>
+              </a:spcAft>
+              <a:buFont typeface="Arial" pitchFamily="34" charset="0"/>
+              <a:buChar char="•"/>
+              <a:defRPr/>
+            </a:pPr>
+            <a:r>
+              <a:rPr lang="en-US" dirty="0" smtClean="0"/>
+              <a:t>Current Development</a:t>
+            </a:r>
+          </a:p>
+          <a:p>
+            <a:pPr lvl="1" fontAlgn="auto">
+              <a:spcAft>
+                <a:spcPts val="0"/>
+              </a:spcAft>
+              <a:buFont typeface="Arial" pitchFamily="34" charset="0"/>
+              <a:buChar char="•"/>
+              <a:defRPr/>
+            </a:pPr>
+            <a:r>
+              <a:rPr lang="en-US" dirty="0" smtClean="0"/>
+              <a:t>Project Manager</a:t>
+            </a:r>
+          </a:p>
+          <a:p>
+            <a:pPr fontAlgn="auto">
+              <a:spcAft>
+                <a:spcPts val="0"/>
+              </a:spcAft>
+              <a:buFont typeface="Arial" pitchFamily="34" charset="0"/>
+              <a:buChar char="•"/>
+              <a:defRPr/>
+            </a:pPr>
+            <a:r>
+              <a:rPr lang="en-US" dirty="0" smtClean="0"/>
+              <a:t>Future Development</a:t>
+            </a:r>
+          </a:p>
+          <a:p>
+            <a:pPr lvl="1" fontAlgn="auto">
+              <a:spcAft>
+                <a:spcPts val="0"/>
+              </a:spcAft>
+              <a:buFont typeface="Arial" pitchFamily="34" charset="0"/>
+              <a:buChar char="•"/>
+              <a:defRPr/>
+            </a:pPr>
+            <a:r>
+              <a:rPr lang="en-US" dirty="0" smtClean="0"/>
+              <a:t>Standard Templates </a:t>
+            </a:r>
+          </a:p>
+          <a:p>
+            <a:pPr lvl="2" fontAlgn="auto">
+              <a:spcAft>
+                <a:spcPts val="0"/>
+              </a:spcAft>
+              <a:buFont typeface="Arial" pitchFamily="34" charset="0"/>
+              <a:buChar char="•"/>
+              <a:defRPr/>
+            </a:pPr>
+            <a:r>
+              <a:rPr lang="en-US" dirty="0" smtClean="0"/>
+              <a:t>.launch, .</a:t>
+            </a:r>
+            <a:r>
+              <a:rPr lang="en-US" dirty="0" err="1" smtClean="0"/>
+              <a:t>msg</a:t>
+            </a:r>
+            <a:r>
+              <a:rPr lang="en-US" dirty="0" smtClean="0"/>
+              <a:t>, .</a:t>
+            </a:r>
+            <a:r>
+              <a:rPr lang="en-US" dirty="0" err="1" smtClean="0"/>
+              <a:t>srv</a:t>
+            </a:r>
+            <a:r>
+              <a:rPr lang="en-US" dirty="0" smtClean="0"/>
+              <a:t>, .urdf</a:t>
+            </a:r>
+          </a:p>
+          <a:p>
+            <a:pPr lvl="2" fontAlgn="auto">
+              <a:spcAft>
+                <a:spcPts val="0"/>
+              </a:spcAft>
+              <a:buFont typeface="Arial" pitchFamily="34" charset="0"/>
+              <a:buChar char="•"/>
+              <a:defRPr/>
+            </a:pPr>
+            <a:r>
+              <a:rPr lang="en-US" dirty="0" smtClean="0"/>
+              <a:t>New package</a:t>
+            </a:r>
+          </a:p>
+          <a:p>
+            <a:pPr lvl="2" fontAlgn="auto">
+              <a:spcAft>
+                <a:spcPts val="0"/>
+              </a:spcAft>
+              <a:buFont typeface="Arial" pitchFamily="34" charset="0"/>
+              <a:buChar char="•"/>
+              <a:defRPr/>
+            </a:pPr>
+            <a:r>
+              <a:rPr lang="en-US" dirty="0" smtClean="0"/>
+              <a:t>Basic node</a:t>
+            </a:r>
+          </a:p>
+          <a:p>
+            <a:pPr lvl="2" fontAlgn="auto">
+              <a:spcAft>
+                <a:spcPts val="0"/>
+              </a:spcAft>
+              <a:buFont typeface="Arial" pitchFamily="34" charset="0"/>
+              <a:buChar char="•"/>
+              <a:defRPr/>
+            </a:pPr>
+            <a:r>
+              <a:rPr lang="en-US" dirty="0" smtClean="0"/>
+              <a:t>User defined templates</a:t>
+            </a:r>
+          </a:p>
+          <a:p>
+            <a:pPr lvl="1" fontAlgn="auto">
+              <a:spcAft>
+                <a:spcPts val="0"/>
+              </a:spcAft>
+              <a:buFont typeface="Arial" pitchFamily="34" charset="0"/>
+              <a:buChar char="•"/>
+              <a:defRPr/>
+            </a:pPr>
+            <a:r>
+              <a:rPr lang="en-US" dirty="0" smtClean="0"/>
+              <a:t>Custom File Editors</a:t>
+            </a:r>
+          </a:p>
+          <a:p>
+            <a:pPr lvl="2" fontAlgn="auto">
+              <a:spcAft>
+                <a:spcPts val="0"/>
+              </a:spcAft>
+              <a:buFont typeface="Arial" pitchFamily="34" charset="0"/>
+              <a:buChar char="•"/>
+              <a:defRPr/>
+            </a:pPr>
+            <a:r>
+              <a:rPr lang="en-US" dirty="0" smtClean="0"/>
+              <a:t>.launch</a:t>
+            </a:r>
+          </a:p>
+          <a:p>
+            <a:pPr lvl="2" fontAlgn="auto">
+              <a:spcAft>
+                <a:spcPts val="0"/>
+              </a:spcAft>
+              <a:buFont typeface="Arial" pitchFamily="34" charset="0"/>
+              <a:buChar char="•"/>
+              <a:defRPr/>
+            </a:pPr>
+            <a:r>
+              <a:rPr lang="en-US" dirty="0" smtClean="0"/>
+              <a:t>.urdf</a:t>
+            </a:r>
+          </a:p>
+          <a:p>
+            <a:pPr lvl="2" fontAlgn="auto">
+              <a:spcAft>
+                <a:spcPts val="0"/>
+              </a:spcAft>
+              <a:buFont typeface="Arial" pitchFamily="34" charset="0"/>
+              <a:buChar char="•"/>
+              <a:defRPr/>
+            </a:pPr>
+            <a:r>
+              <a:rPr lang="en-US" dirty="0" smtClean="0"/>
+              <a:t>.macro</a:t>
+            </a:r>
+          </a:p>
+          <a:p>
+            <a:pPr lvl="1" fontAlgn="auto">
+              <a:spcAft>
+                <a:spcPts val="0"/>
+              </a:spcAft>
+              <a:buFont typeface="Arial" pitchFamily="34" charset="0"/>
+              <a:buChar char="•"/>
+              <a:defRPr/>
+            </a:pPr>
+            <a:r>
+              <a:rPr lang="en-US" dirty="0" smtClean="0"/>
+              <a:t>Formatting Tool</a:t>
+            </a:r>
+          </a:p>
+          <a:p>
+            <a:pPr lvl="2" fontAlgn="auto">
+              <a:spcAft>
+                <a:spcPts val="0"/>
+              </a:spcAft>
+              <a:buFont typeface="Arial" pitchFamily="34" charset="0"/>
+              <a:buChar char="•"/>
+              <a:defRPr/>
+            </a:pPr>
+            <a:r>
+              <a:rPr lang="en-US" dirty="0" smtClean="0"/>
+              <a:t>Provide ROS format warnings</a:t>
+            </a:r>
+          </a:p>
+          <a:p>
+            <a:pPr lvl="1" fontAlgn="auto">
+              <a:spcAft>
+                <a:spcPts val="0"/>
+              </a:spcAft>
+              <a:buFont typeface="Arial" pitchFamily="34" charset="0"/>
+              <a:buChar char="•"/>
+              <a:defRPr/>
+            </a:pPr>
+            <a:r>
+              <a:rPr lang="en-US" dirty="0"/>
+              <a:t>I</a:t>
+            </a:r>
+            <a:r>
+              <a:rPr lang="en-US" dirty="0" smtClean="0"/>
+              <a:t>nterface to existing ROS Tools</a:t>
+            </a:r>
+          </a:p>
+          <a:p>
+            <a:pPr lvl="2" fontAlgn="auto">
+              <a:spcAft>
+                <a:spcPts val="0"/>
+              </a:spcAft>
+              <a:buFont typeface="Arial" pitchFamily="34" charset="0"/>
+              <a:buChar char="•"/>
+              <a:defRPr/>
+            </a:pPr>
+            <a:r>
+              <a:rPr lang="en-US" dirty="0" err="1"/>
+              <a:t>r</a:t>
+            </a:r>
+            <a:r>
+              <a:rPr lang="en-US" dirty="0" err="1" smtClean="0"/>
+              <a:t>osnode</a:t>
+            </a:r>
+            <a:r>
+              <a:rPr lang="en-US" dirty="0" smtClean="0"/>
+              <a:t> list</a:t>
+            </a:r>
+          </a:p>
+          <a:p>
+            <a:pPr lvl="2" fontAlgn="auto">
+              <a:spcAft>
+                <a:spcPts val="0"/>
+              </a:spcAft>
+              <a:buFont typeface="Arial" pitchFamily="34" charset="0"/>
+              <a:buChar char="•"/>
+              <a:defRPr/>
+            </a:pPr>
+            <a:r>
+              <a:rPr lang="en-US" dirty="0" err="1"/>
+              <a:t>r</a:t>
+            </a:r>
+            <a:r>
+              <a:rPr lang="en-US" dirty="0" err="1" smtClean="0"/>
+              <a:t>osparam</a:t>
+            </a:r>
+            <a:r>
+              <a:rPr lang="en-US" dirty="0" smtClean="0"/>
+              <a:t> list</a:t>
+            </a:r>
+          </a:p>
+          <a:p>
+            <a:pPr lvl="1" fontAlgn="auto">
+              <a:spcAft>
+                <a:spcPts val="0"/>
+              </a:spcAft>
+              <a:buFont typeface="Arial" pitchFamily="34" charset="0"/>
+              <a:buChar char="•"/>
+              <a:defRPr/>
+            </a:pPr>
+            <a:r>
+              <a:rPr lang="en-US" dirty="0" smtClean="0"/>
+              <a:t>Dock all existing ROS GUI tools</a:t>
+            </a:r>
+          </a:p>
+          <a:p>
+            <a:pPr lvl="2" fontAlgn="auto">
+              <a:spcAft>
+                <a:spcPts val="0"/>
+              </a:spcAft>
+              <a:buFont typeface="Arial" pitchFamily="34" charset="0"/>
+              <a:buChar char="•"/>
+              <a:defRPr/>
+            </a:pPr>
+            <a:r>
+              <a:rPr lang="en-US" dirty="0" err="1" smtClean="0"/>
+              <a:t>Rqt</a:t>
+            </a:r>
+            <a:endParaRPr lang="en-US" dirty="0" smtClean="0"/>
+          </a:p>
+          <a:p>
+            <a:pPr lvl="2" fontAlgn="auto">
+              <a:spcAft>
+                <a:spcPts val="0"/>
+              </a:spcAft>
+              <a:buFont typeface="Arial" pitchFamily="34" charset="0"/>
+              <a:buChar char="•"/>
+              <a:defRPr/>
+            </a:pPr>
+            <a:r>
+              <a:rPr lang="en-US" dirty="0" smtClean="0"/>
+              <a:t>SMACH</a:t>
+            </a:r>
+          </a:p>
+          <a:p>
+            <a:pPr lvl="1" fontAlgn="auto">
+              <a:spcAft>
+                <a:spcPts val="0"/>
+              </a:spcAft>
+              <a:buFont typeface="Arial" pitchFamily="34" charset="0"/>
+              <a:buChar char="•"/>
+              <a:defRPr/>
+            </a:pPr>
+            <a:r>
+              <a:rPr lang="en-US" dirty="0" smtClean="0"/>
+              <a:t>Global Settings </a:t>
+            </a:r>
+          </a:p>
+        </p:txBody>
+      </p:sp>
+      <p:pic>
+        <p:nvPicPr>
+          <p:cNvPr id="1026" name="Picture 2" descr="R:\AES\Armstrong\project2.png"/>
+          <p:cNvPicPr>
+            <a:picLocks noChangeAspect="1" noChangeArrowheads="1"/>
+          </p:cNvPicPr>
+          <p:nvPr/>
+        </p:nvPicPr>
+        <p:blipFill>
+          <a:blip r:embed="rId2" cstate="print">
+            <a:extLst>
+              <a:ext uri="{28A0092B-C50C-407E-A947-70E740481C1C}">
+                <a14:useLocalDpi xmlns="" xmlns:a14="http://schemas.microsoft.com/office/drawing/2010/main" val="0"/>
+              </a:ext>
+            </a:extLst>
+          </a:blip>
+          <a:srcRect/>
+          <a:stretch>
+            <a:fillRect/>
+          </a:stretch>
+        </p:blipFill>
+        <p:spPr bwMode="auto">
+          <a:xfrm>
+            <a:off x="3716780" y="1679402"/>
+            <a:ext cx="5357813" cy="4191000"/>
+          </a:xfrm>
+          <a:prstGeom prst="rect">
+            <a:avLst/>
+          </a:prstGeom>
+          <a:noFill/>
+          <a:extLst>
+            <a:ext uri="{909E8E84-426E-40DD-AFC4-6F175D3DCCD1}">
+              <a14:hiddenFill xmlns="" xmlns:a14="http://schemas.microsoft.com/office/drawing/2010/main">
+                <a:solidFill>
+                  <a:srgbClr val="FFFFFF"/>
+                </a:solidFill>
+              </a14:hiddenFill>
+            </a:ext>
+          </a:extLst>
+        </p:spPr>
+      </p:pic>
+    </p:spTree>
+  </p:cSld>
+  <p:clrMapOvr>
+    <a:masterClrMapping/>
+  </p:clrMapOvr>
+</p:sld>
+</file>
+
+<file path=ppt/slides/slide9.xml><?xml version="1.0" encoding="utf-8"?>
+<p:sld xmlns:a="http://schemas.openxmlformats.org/drawingml/2006/main" xmlns:r="http://schemas.openxmlformats.org/officeDocument/2006/relationships" xmlns:p="http://schemas.openxmlformats.org/presentationml/2006/main">
+  <p:cSld>
+    <p:spTree>
+      <p:nvGrpSpPr>
+        <p:cNvPr id="1" name=""/>
+        <p:cNvGrpSpPr/>
+        <p:nvPr/>
+      </p:nvGrpSpPr>
+      <p:grpSpPr>
+        <a:xfrm>
+          <a:off x="0" y="0"/>
+          <a:ext cx="0" cy="0"/>
+          <a:chOff x="0" y="0"/>
+          <a:chExt cx="0" cy="0"/>
+        </a:xfrm>
+      </p:grpSpPr>
+      <p:sp>
+        <p:nvSpPr>
+          <p:cNvPr id="15361" name="Title 1"/>
+          <p:cNvSpPr>
+            <a:spLocks noGrp="1"/>
+          </p:cNvSpPr>
+          <p:nvPr>
+            <p:ph type="title"/>
           </p:nvPr>
         </p:nvSpPr>
         <p:spPr/>
@@ -4367,13 +7581,134 @@
           <a:bodyPr/>
           <a:lstStyle/>
           <a:p>
-            <a:pPr marL="0" indent="0">
-              <a:buNone/>
-            </a:pPr>
-            <a:endParaRPr lang="en-US" altLang="nl-NL" dirty="0" smtClean="0"/>
-          </a:p>
-        </p:txBody>
-      </p:sp>
+            <a:r>
+              <a:rPr lang="en-US" altLang="nl-NL" dirty="0" smtClean="0"/>
+              <a:t>ROS Project Manager Plugin</a:t>
+            </a:r>
+          </a:p>
+        </p:txBody>
+      </p:sp>
+      <p:pic>
+        <p:nvPicPr>
+          <p:cNvPr id="2051" name="Picture 3" descr="R:\AES\Armstrong\import2.png"/>
+          <p:cNvPicPr>
+            <a:picLocks noChangeAspect="1" noChangeArrowheads="1"/>
+          </p:cNvPicPr>
+          <p:nvPr/>
+        </p:nvPicPr>
+        <p:blipFill>
+          <a:blip r:embed="rId2" cstate="print">
+            <a:extLst>
+              <a:ext uri="{28A0092B-C50C-407E-A947-70E740481C1C}">
+                <a14:useLocalDpi xmlns="" xmlns:a14="http://schemas.microsoft.com/office/drawing/2010/main" val="0"/>
+              </a:ext>
+            </a:extLst>
+          </a:blip>
+          <a:srcRect/>
+          <a:stretch>
+            <a:fillRect/>
+          </a:stretch>
+        </p:blipFill>
+        <p:spPr bwMode="auto">
+          <a:xfrm>
+            <a:off x="147125" y="3532359"/>
+            <a:ext cx="4114800" cy="2965910"/>
+          </a:xfrm>
+          <a:prstGeom prst="rect">
+            <a:avLst/>
+          </a:prstGeom>
+          <a:noFill/>
+          <a:extLst>
+            <a:ext uri="{909E8E84-426E-40DD-AFC4-6F175D3DCCD1}">
+              <a14:hiddenFill xmlns="" xmlns:a14="http://schemas.microsoft.com/office/drawing/2010/main">
+                <a:solidFill>
+                  <a:srgbClr val="FFFFFF"/>
+                </a:solidFill>
+              </a14:hiddenFill>
+            </a:ext>
+          </a:extLst>
+        </p:spPr>
+      </p:pic>
+      <p:pic>
+        <p:nvPicPr>
+          <p:cNvPr id="2052" name="Picture 4" descr="R:\AES\Armstrong\new_project.png"/>
+          <p:cNvPicPr>
+            <a:picLocks noChangeAspect="1" noChangeArrowheads="1"/>
+          </p:cNvPicPr>
+          <p:nvPr/>
+        </p:nvPicPr>
+        <p:blipFill>
+          <a:blip r:embed="rId3" cstate="print">
+            <a:extLst>
+              <a:ext uri="{28A0092B-C50C-407E-A947-70E740481C1C}">
+                <a14:useLocalDpi xmlns="" xmlns:a14="http://schemas.microsoft.com/office/drawing/2010/main" val="0"/>
+              </a:ext>
+            </a:extLst>
+          </a:blip>
+          <a:srcRect/>
+          <a:stretch>
+            <a:fillRect/>
+          </a:stretch>
+        </p:blipFill>
+        <p:spPr bwMode="auto">
+          <a:xfrm>
+            <a:off x="147123" y="1226049"/>
+            <a:ext cx="4114800" cy="2260141"/>
+          </a:xfrm>
+          <a:prstGeom prst="rect">
+            <a:avLst/>
+          </a:prstGeom>
+          <a:noFill/>
+          <a:extLst>
+            <a:ext uri="{909E8E84-426E-40DD-AFC4-6F175D3DCCD1}">
+              <a14:hiddenFill xmlns="" xmlns:a14="http://schemas.microsoft.com/office/drawing/2010/main">
+                <a:solidFill>
+                  <a:srgbClr val="FFFFFF"/>
+                </a:solidFill>
+              </a14:hiddenFill>
+            </a:ext>
+          </a:extLst>
+        </p:spPr>
+      </p:pic>
+      <p:pic>
+        <p:nvPicPr>
+          <p:cNvPr id="2053" name="Picture 5" descr="R:\AES\Armstrong\build_debug_sourced.png"/>
+          <p:cNvPicPr>
+            <a:picLocks noChangeAspect="1" noChangeArrowheads="1"/>
+          </p:cNvPicPr>
+          <p:nvPr/>
+        </p:nvPicPr>
+        <p:blipFill rotWithShape="1">
+          <a:blip r:embed="rId4" cstate="print">
+            <a:extLst>
+              <a:ext uri="{28A0092B-C50C-407E-A947-70E740481C1C}">
+                <a14:useLocalDpi xmlns="" xmlns:a14="http://schemas.microsoft.com/office/drawing/2010/main" val="0"/>
+              </a:ext>
+            </a:extLst>
+          </a:blip>
+          <a:srcRect r="49024"/>
+          <a:stretch/>
+        </p:blipFill>
+        <p:spPr bwMode="auto">
+          <a:xfrm>
+            <a:off x="4340463" y="1226049"/>
+            <a:ext cx="4721069" cy="5272220"/>
+          </a:xfrm>
+          <a:prstGeom prst="rect">
+            <a:avLst/>
+          </a:prstGeom>
+          <a:noFill/>
+          <a:extLst>
+            <a:ext uri="{909E8E84-426E-40DD-AFC4-6F175D3DCCD1}">
+              <a14:hiddenFill xmlns="" xmlns:a14="http://schemas.microsoft.com/office/drawing/2010/main">
+                <a:solidFill>
+                  <a:srgbClr val="FFFFFF"/>
+                </a:solidFill>
+              </a14:hiddenFill>
+            </a:ext>
+          </a:extLst>
+        </p:spPr>
+      </p:pic>
     </p:spTree>
   </p:cSld>
   <p:clrMapOvr>
@@ -4663,4 +7998,287 @@
   <a:objectDefaults/>
   <a:extraClrSchemeLst/>
 </a:theme>
+</file>
+
+<file path=ppt/theme/theme2.xml><?xml version="1.0" encoding="utf-8"?>
+<a:theme xmlns:a="http://schemas.openxmlformats.org/drawingml/2006/main" name="Office Theme">
+  <a:themeElements>
+    <a:clrScheme name="Office">
+      <a:dk1>
+        <a:sysClr val="windowText" lastClr="000000"/>
+      </a:dk1>
+      <a:lt1>
+        <a:sysClr val="window" lastClr="FFFFFF"/>
+      </a:lt1>
+      <a:dk2>
+        <a:srgbClr val="1F497D"/>
+      </a:dk2>
+      <a:lt2>
+        <a:srgbClr val="EEECE1"/>
+      </a:lt2>
+      <a:accent1>
+        <a:srgbClr val="4F81BD"/>
+      </a:accent1>
+      <a:accent2>
+        <a:srgbClr val="C0504D"/>
+      </a:accent2>
+      <a:accent3>
+        <a:srgbClr val="9BBB59"/>
+      </a:accent3>
+      <a:accent4>
+        <a:srgbClr val="8064A2"/>
+      </a:accent4>
+      <a:accent5>
+        <a:srgbClr val="4BACC6"/>
+      </a:accent5>
+      <a:accent6>
+        <a:srgbClr val="F79646"/>
+      </a:accent6>
+      <a:hlink>
+        <a:srgbClr val="0000FF"/>
+      </a:hlink>
+      <a:folHlink>
+        <a:srgbClr val="800080"/>
+      </a:folHlink>
+    </a:clrScheme>
+    <a:fontScheme name="Office">
+      <a:majorFont>
+        <a:latin typeface="Calibri"/>
+        <a:ea typeface=""/>
+        <a:cs typeface=""/>
+        <a:font script="Jpan" typeface="ＭＳ Ｐゴシック"/>
+        <a:font script="Hang" typeface="맑은 고딕"/>
+        <a:font script="Hans" typeface="宋体"/>
+        <a:font script="Hant" typeface="新細明體"/>
+        <a:font script="Arab" typeface="Times New Roman"/>
+        <a:font script="Hebr" typeface="Times New Roman"/>
+        <a:font script="Thai" typeface="Angsana New"/>
+        <a:font script="Ethi" typeface="Nyala"/>
+        <a:font script="Beng" typeface="Vrinda"/>
+        <a:font script="Gujr" typeface="Shruti"/>
+        <a:font script="Khmr" typeface="MoolBoran"/>
+        <a:font script="Knda" typeface="Tunga"/>
+        <a:font script="Guru" typeface="Raavi"/>
+        <a:font script="Cans" typeface="Euphemia"/>
+        <a:font script="Cher" typeface="Plantagenet Cherokee"/>
+        <a:font script="Yiii" typeface="Microsoft Yi Baiti"/>
+        <a:font script="Tibt" typeface="Microsoft Himalaya"/>
+        <a:font script="Thaa" typeface="MV Boli"/>
+        <a:font script="Deva" typeface="Mangal"/>
+        <a:font script="Telu" typeface="Gautami"/>
+        <a:font script="Taml" typeface="Latha"/>
+        <a:font script="Syrc" typeface="Estrangelo Edessa"/>
+        <a:font script="Orya" typeface="Kalinga"/>
+        <a:font script="Mlym" typeface="Kartika"/>
+        <a:font script="Laoo" typeface="DokChampa"/>
+        <a:font script="Sinh" typeface="Iskoola Pota"/>
+        <a:font script="Mong" typeface="Mongolian Baiti"/>
+        <a:font script="Viet" typeface="Times New Roman"/>
+        <a:font script="Uigh" typeface="Microsoft Uighur"/>
+      </a:majorFont>
+      <a:minorFont>
+        <a:latin typeface="Calibri"/>
+        <a:ea typeface=""/>
+        <a:cs typeface=""/>
+        <a:font script="Jpan" typeface="ＭＳ Ｐゴシック"/>
+        <a:font script="Hang" typeface="맑은 고딕"/>
+        <a:font script="Hans" typeface="宋体"/>
+        <a:font script="Hant" typeface="新細明體"/>
+        <a:font script="Arab" typeface="Arial"/>
+        <a:font script="Hebr" typeface="Arial"/>
+        <a:font script="Thai" typeface="Cordia New"/>
+        <a:font script="Ethi" typeface="Nyala"/>
+        <a:font script="Beng" typeface="Vrinda"/>
+        <a:font script="Gujr" typeface="Shruti"/>
+        <a:font script="Khmr" typeface="DaunPenh"/>
+        <a:font script="Knda" typeface="Tunga"/>
+        <a:font script="Guru" typeface="Raavi"/>
+        <a:font script="Cans" typeface="Euphemia"/>
+        <a:font script="Cher" typeface="Plantagenet Cherokee"/>
+        <a:font script="Yiii" typeface="Microsoft Yi Baiti"/>
+        <a:font script="Tibt" typeface="Microsoft Himalaya"/>
+        <a:font script="Thaa" typeface="MV Boli"/>
+        <a:font script="Deva" typeface="Mangal"/>
+        <a:font script="Telu" typeface="Gautami"/>
+        <a:font script="Taml" typeface="Latha"/>
+        <a:font script="Syrc" typeface="Estrangelo Edessa"/>
+        <a:font script="Orya" typeface="Kalinga"/>
+        <a:font script="Mlym" typeface="Kartika"/>
+        <a:font script="Laoo" typeface="DokChampa"/>
+        <a:font script="Sinh" typeface="Iskoola Pota"/>
+        <a:font script="Mong" typeface="Mongolian Baiti"/>
+        <a:font script="Viet" typeface="Arial"/>
+        <a:font script="Uigh" typeface="Microsoft Uighur"/>
+      </a:minorFont>
+    </a:fontScheme>
+    <a:fmtScheme name="Office">
+      <a:fillStyleLst>
+        <a:solidFill>
+          <a:schemeClr val="phClr"/>
+        </a:solidFill>
+        <a:gradFill rotWithShape="1">
+          <a:gsLst>
+            <a:gs pos="0">
+              <a:schemeClr val="phClr">
+                <a:tint val="50000"/>
+                <a:satMod val="300000"/>
+              </a:schemeClr>
+            </a:gs>
+            <a:gs pos="35000">
+              <a:schemeClr val="phClr">
+                <a:tint val="37000"/>
+                <a:satMod val="300000"/>
+              </a:schemeClr>
+            </a:gs>
+            <a:gs pos="100000">
+              <a:schemeClr val="phClr">
+                <a:tint val="15000"/>
+                <a:satMod val="350000"/>
+              </a:schemeClr>
+            </a:gs>
+          </a:gsLst>
+          <a:lin ang="16200000" scaled="1"/>
+        </a:gradFill>
+        <a:gradFill rotWithShape="1">
+          <a:gsLst>
+            <a:gs pos="0">
+              <a:schemeClr val="phClr">
+                <a:shade val="51000"/>
+                <a:satMod val="130000"/>
+              </a:schemeClr>
+            </a:gs>
+            <a:gs pos="80000">
+              <a:schemeClr val="phClr">
+                <a:shade val="93000"/>
+                <a:satMod val="130000"/>
+              </a:schemeClr>
+            </a:gs>
+            <a:gs pos="100000">
+              <a:schemeClr val="phClr">
+                <a:shade val="94000"/>
+                <a:satMod val="135000"/>
+              </a:schemeClr>
+            </a:gs>
+          </a:gsLst>
+          <a:lin ang="16200000" scaled="0"/>
+        </a:gradFill>
+      </a:fillStyleLst>
+      <a:lnStyleLst>
+        <a:ln w="9525" cap="flat" cmpd="sng" algn="ctr">
+          <a:solidFill>
+            <a:schemeClr val="phClr">
+              <a:shade val="95000"/>
+              <a:satMod val="105000"/>
+            </a:schemeClr>
+          </a:solidFill>
+          <a:prstDash val="solid"/>
+        </a:ln>
+        <a:ln w="25400" cap="flat" cmpd="sng" algn="ctr">
+          <a:solidFill>
+            <a:schemeClr val="phClr"/>
+          </a:solidFill>
+          <a:prstDash val="solid"/>
+        </a:ln>
+        <a:ln w="38100" cap="flat" cmpd="sng" algn="ctr">
+          <a:solidFill>
+            <a:schemeClr val="phClr"/>
+          </a:solidFill>
+          <a:prstDash val="solid"/>
+        </a:ln>
+      </a:lnStyleLst>
+      <a:effectStyleLst>
+        <a:effectStyle>
+          <a:effectLst>
+            <a:outerShdw blurRad="40000" dist="20000" dir="5400000" rotWithShape="0">
+              <a:srgbClr val="000000">
+                <a:alpha val="38000"/>
+              </a:srgbClr>
+            </a:outerShdw>
+          </a:effectLst>
+        </a:effectStyle>
+        <a:effectStyle>
+          <a:effectLst>
+            <a:outerShdw blurRad="40000" dist="23000" dir="5400000" rotWithShape="0">
+              <a:srgbClr val="000000">
+                <a:alpha val="35000"/>
+              </a:srgbClr>
+            </a:outerShdw>
+          </a:effectLst>
+        </a:effectStyle>
+        <a:effectStyle>
+          <a:effectLst>
+            <a:outerShdw blurRad="40000" dist="23000" dir="5400000" rotWithShape="0">
+              <a:srgbClr val="000000">
+                <a:alpha val="35000"/>
+              </a:srgbClr>
+            </a:outerShdw>
+          </a:effectLst>
+          <a:scene3d>
+            <a:camera prst="orthographicFront">
+              <a:rot lat="0" lon="0" rev="0"/>
+            </a:camera>
+            <a:lightRig rig="threePt" dir="t">
+              <a:rot lat="0" lon="0" rev="1200000"/>
+            </a:lightRig>
+          </a:scene3d>
+          <a:sp3d>
+            <a:bevelT w="63500" h="25400"/>
+          </a:sp3d>
+        </a:effectStyle>
+      </a:effectStyleLst>
+      <a:bgFillStyleLst>
+        <a:solidFill>
+          <a:schemeClr val="phClr"/>
+        </a:solidFill>
+        <a:gradFill rotWithShape="1">
+          <a:gsLst>
+            <a:gs pos="0">
+              <a:schemeClr val="phClr">
+                <a:tint val="40000"/>
+                <a:satMod val="350000"/>
+              </a:schemeClr>
+            </a:gs>
+            <a:gs pos="40000">
+              <a:schemeClr val="phClr">
+                <a:tint val="45000"/>
+                <a:shade val="99000"/>
+                <a:satMod val="350000"/>
+              </a:schemeClr>
+            </a:gs>
+            <a:gs pos="100000">
+              <a:schemeClr val="phClr">
+                <a:shade val="20000"/>
+                <a:satMod val="255000"/>
+              </a:schemeClr>
+            </a:gs>
+          </a:gsLst>
+          <a:path path="circle">
+            <a:fillToRect l="50000" t="-80000" r="50000" b="180000"/>
+          </a:path>
+        </a:gradFill>
+        <a:gradFill rotWithShape="1">
+          <a:gsLst>
+            <a:gs pos="0">
+              <a:schemeClr val="phClr">
+                <a:tint val="80000"/>
+                <a:satMod val="300000"/>
+              </a:schemeClr>
+            </a:gs>
+            <a:gs pos="100000">
+              <a:schemeClr val="phClr">
+                <a:shade val="30000"/>
+                <a:satMod val="200000"/>
+              </a:schemeClr>
+            </a:gs>
+          </a:gsLst>
+          <a:path path="circle">
+            <a:fillToRect l="50000" t="50000" r="50000" b="50000"/>
+          </a:path>
+        </a:gradFill>
+      </a:bgFillStyleLst>
+    </a:fmtScheme>
+  </a:themeElements>
+  <a:objectDefaults/>
+  <a:extraClrSchemeLst/>
+</a:theme>
 </file>
</xml_diff>